<commit_message>
Le train avait sauté
</commit_message>
<xml_diff>
--- a/Chapitre_03_TorseursCinetiquesDynamiques/Application_01/images/Figures.pptx
+++ b/Chapitre_03_TorseursCinetiquesDynamiques/Application_01/images/Figures.pptx
@@ -6,6 +6,7 @@
   </p:sldMasterIdLst>
   <p:sldIdLst>
     <p:sldId id="256" r:id="rId2"/>
+    <p:sldId id="257" r:id="rId3"/>
   </p:sldIdLst>
   <p:sldSz cx="9144000" cy="6858000" type="screen4x3"/>
   <p:notesSz cx="6858000" cy="9144000"/>
@@ -288,7 +289,7 @@
           <a:p>
             <a:fld id="{AA309A6D-C09C-4548-B29A-6CF363A7E532}" type="datetimeFigureOut">
               <a:rPr lang="fr-FR" smtClean="0"/>
-              <a:t>20/11/2017</a:t>
+              <a:t>23/11/2017</a:t>
             </a:fld>
             <a:endParaRPr lang="fr-BE"/>
           </a:p>
@@ -453,7 +454,7 @@
           <a:p>
             <a:fld id="{AA309A6D-C09C-4548-B29A-6CF363A7E532}" type="datetimeFigureOut">
               <a:rPr lang="fr-FR" smtClean="0"/>
-              <a:t>20/11/2017</a:t>
+              <a:t>23/11/2017</a:t>
             </a:fld>
             <a:endParaRPr lang="fr-BE"/>
           </a:p>
@@ -628,7 +629,7 @@
           <a:p>
             <a:fld id="{AA309A6D-C09C-4548-B29A-6CF363A7E532}" type="datetimeFigureOut">
               <a:rPr lang="fr-FR" smtClean="0"/>
-              <a:t>20/11/2017</a:t>
+              <a:t>23/11/2017</a:t>
             </a:fld>
             <a:endParaRPr lang="fr-BE"/>
           </a:p>
@@ -793,7 +794,7 @@
           <a:p>
             <a:fld id="{AA309A6D-C09C-4548-B29A-6CF363A7E532}" type="datetimeFigureOut">
               <a:rPr lang="fr-FR" smtClean="0"/>
-              <a:t>20/11/2017</a:t>
+              <a:t>23/11/2017</a:t>
             </a:fld>
             <a:endParaRPr lang="fr-BE"/>
           </a:p>
@@ -1034,7 +1035,7 @@
           <a:p>
             <a:fld id="{AA309A6D-C09C-4548-B29A-6CF363A7E532}" type="datetimeFigureOut">
               <a:rPr lang="fr-FR" smtClean="0"/>
-              <a:t>20/11/2017</a:t>
+              <a:t>23/11/2017</a:t>
             </a:fld>
             <a:endParaRPr lang="fr-BE"/>
           </a:p>
@@ -1317,7 +1318,7 @@
           <a:p>
             <a:fld id="{AA309A6D-C09C-4548-B29A-6CF363A7E532}" type="datetimeFigureOut">
               <a:rPr lang="fr-FR" smtClean="0"/>
-              <a:t>20/11/2017</a:t>
+              <a:t>23/11/2017</a:t>
             </a:fld>
             <a:endParaRPr lang="fr-BE"/>
           </a:p>
@@ -1734,7 +1735,7 @@
           <a:p>
             <a:fld id="{AA309A6D-C09C-4548-B29A-6CF363A7E532}" type="datetimeFigureOut">
               <a:rPr lang="fr-FR" smtClean="0"/>
-              <a:t>20/11/2017</a:t>
+              <a:t>23/11/2017</a:t>
             </a:fld>
             <a:endParaRPr lang="fr-BE"/>
           </a:p>
@@ -1847,7 +1848,7 @@
           <a:p>
             <a:fld id="{AA309A6D-C09C-4548-B29A-6CF363A7E532}" type="datetimeFigureOut">
               <a:rPr lang="fr-FR" smtClean="0"/>
-              <a:t>20/11/2017</a:t>
+              <a:t>23/11/2017</a:t>
             </a:fld>
             <a:endParaRPr lang="fr-BE"/>
           </a:p>
@@ -1937,7 +1938,7 @@
           <a:p>
             <a:fld id="{AA309A6D-C09C-4548-B29A-6CF363A7E532}" type="datetimeFigureOut">
               <a:rPr lang="fr-FR" smtClean="0"/>
-              <a:t>20/11/2017</a:t>
+              <a:t>23/11/2017</a:t>
             </a:fld>
             <a:endParaRPr lang="fr-BE"/>
           </a:p>
@@ -2209,7 +2210,7 @@
           <a:p>
             <a:fld id="{AA309A6D-C09C-4548-B29A-6CF363A7E532}" type="datetimeFigureOut">
               <a:rPr lang="fr-FR" smtClean="0"/>
-              <a:t>20/11/2017</a:t>
+              <a:t>23/11/2017</a:t>
             </a:fld>
             <a:endParaRPr lang="fr-BE"/>
           </a:p>
@@ -2457,7 +2458,7 @@
           <a:p>
             <a:fld id="{AA309A6D-C09C-4548-B29A-6CF363A7E532}" type="datetimeFigureOut">
               <a:rPr lang="fr-FR" smtClean="0"/>
-              <a:t>20/11/2017</a:t>
+              <a:t>23/11/2017</a:t>
             </a:fld>
             <a:endParaRPr lang="fr-BE"/>
           </a:p>
@@ -2665,7 +2666,7 @@
           <a:p>
             <a:fld id="{AA309A6D-C09C-4548-B29A-6CF363A7E532}" type="datetimeFigureOut">
               <a:rPr lang="fr-FR" smtClean="0"/>
-              <a:t>20/11/2017</a:t>
+              <a:t>23/11/2017</a:t>
             </a:fld>
             <a:endParaRPr lang="fr-BE"/>
           </a:p>
@@ -3071,8 +3072,8 @@
           </a:fontRef>
         </p:style>
       </p:cxnSp>
-      <mc:AlternateContent xmlns:mc="http://schemas.openxmlformats.org/markup-compatibility/2006">
-        <mc:Choice xmlns:a14="http://schemas.microsoft.com/office/drawing/2010/main" Requires="a14">
+      <mc:AlternateContent xmlns:mc="http://schemas.openxmlformats.org/markup-compatibility/2006" xmlns:a14="http://schemas.microsoft.com/office/drawing/2010/main">
+        <mc:Choice Requires="a14">
           <p:sp>
             <p:nvSpPr>
               <p:cNvPr id="87" name="ZoneTexte 86"/>
@@ -3095,6 +3096,7 @@
               </a:bodyPr>
               <a:lstStyle/>
               <a:p>
+                <a:pPr/>
                 <a14:m>
                   <m:oMathPara xmlns:m="http://schemas.openxmlformats.org/officeDocument/2006/math">
                     <m:oMathParaPr>
@@ -3146,7 +3148,7 @@
             </p:txBody>
           </p:sp>
         </mc:Choice>
-        <mc:Fallback>
+        <mc:Fallback xmlns="">
           <p:sp>
             <p:nvSpPr>
               <p:cNvPr id="87" name="ZoneTexte 86"/>
@@ -4616,8 +4618,8 @@
           </a:p>
         </p:txBody>
       </p:sp>
-      <mc:AlternateContent xmlns:mc="http://schemas.openxmlformats.org/markup-compatibility/2006">
-        <mc:Choice xmlns:a14="http://schemas.microsoft.com/office/drawing/2010/main" Requires="a14">
+      <mc:AlternateContent xmlns:mc="http://schemas.openxmlformats.org/markup-compatibility/2006" xmlns:a14="http://schemas.microsoft.com/office/drawing/2010/main">
+        <mc:Choice Requires="a14">
           <p:sp>
             <p:nvSpPr>
               <p:cNvPr id="59" name="ZoneTexte 58"/>
@@ -4640,6 +4642,7 @@
               </a:bodyPr>
               <a:lstStyle/>
               <a:p>
+                <a:pPr/>
                 <a14:m>
                   <m:oMathPara xmlns:m="http://schemas.openxmlformats.org/officeDocument/2006/math">
                     <m:oMathParaPr>
@@ -4660,7 +4663,7 @@
             </p:txBody>
           </p:sp>
         </mc:Choice>
-        <mc:Fallback>
+        <mc:Fallback xmlns="">
           <p:sp>
             <p:nvSpPr>
               <p:cNvPr id="59" name="ZoneTexte 58"/>
@@ -4699,8 +4702,8 @@
           </p:sp>
         </mc:Fallback>
       </mc:AlternateContent>
-      <mc:AlternateContent xmlns:mc="http://schemas.openxmlformats.org/markup-compatibility/2006">
-        <mc:Choice xmlns:a14="http://schemas.microsoft.com/office/drawing/2010/main" Requires="a14">
+      <mc:AlternateContent xmlns:mc="http://schemas.openxmlformats.org/markup-compatibility/2006" xmlns:a14="http://schemas.microsoft.com/office/drawing/2010/main">
+        <mc:Choice Requires="a14">
           <p:sp>
             <p:nvSpPr>
               <p:cNvPr id="60" name="ZoneTexte 59"/>
@@ -4723,6 +4726,7 @@
               </a:bodyPr>
               <a:lstStyle/>
               <a:p>
+                <a:pPr/>
                 <a14:m>
                   <m:oMathPara xmlns:m="http://schemas.openxmlformats.org/officeDocument/2006/math">
                     <m:oMathParaPr>
@@ -4743,7 +4747,7 @@
             </p:txBody>
           </p:sp>
         </mc:Choice>
-        <mc:Fallback>
+        <mc:Fallback xmlns="">
           <p:sp>
             <p:nvSpPr>
               <p:cNvPr id="60" name="ZoneTexte 59"/>
@@ -4782,8 +4786,8 @@
           </p:sp>
         </mc:Fallback>
       </mc:AlternateContent>
-      <mc:AlternateContent xmlns:mc="http://schemas.openxmlformats.org/markup-compatibility/2006">
-        <mc:Choice xmlns:a14="http://schemas.microsoft.com/office/drawing/2010/main" Requires="a14">
+      <mc:AlternateContent xmlns:mc="http://schemas.openxmlformats.org/markup-compatibility/2006" xmlns:a14="http://schemas.microsoft.com/office/drawing/2010/main">
+        <mc:Choice Requires="a14">
           <p:sp>
             <p:nvSpPr>
               <p:cNvPr id="61" name="ZoneTexte 60"/>
@@ -4806,6 +4810,7 @@
               </a:bodyPr>
               <a:lstStyle/>
               <a:p>
+                <a:pPr/>
                 <a14:m>
                   <m:oMathPara xmlns:m="http://schemas.openxmlformats.org/officeDocument/2006/math">
                     <m:oMathParaPr>
@@ -4826,7 +4831,7 @@
             </p:txBody>
           </p:sp>
         </mc:Choice>
-        <mc:Fallback>
+        <mc:Fallback xmlns="">
           <p:sp>
             <p:nvSpPr>
               <p:cNvPr id="61" name="ZoneTexte 60"/>
@@ -5297,8 +5302,8 @@
           </a:p>
         </p:txBody>
       </p:sp>
-      <mc:AlternateContent xmlns:mc="http://schemas.openxmlformats.org/markup-compatibility/2006">
-        <mc:Choice xmlns:a14="http://schemas.microsoft.com/office/drawing/2010/main" Requires="a14">
+      <mc:AlternateContent xmlns:mc="http://schemas.openxmlformats.org/markup-compatibility/2006" xmlns:a14="http://schemas.microsoft.com/office/drawing/2010/main">
+        <mc:Choice Requires="a14">
           <p:sp>
             <p:nvSpPr>
               <p:cNvPr id="76" name="ZoneTexte 75"/>
@@ -5321,6 +5326,7 @@
               </a:bodyPr>
               <a:lstStyle/>
               <a:p>
+                <a:pPr/>
                 <a14:m>
                   <m:oMathPara xmlns:m="http://schemas.openxmlformats.org/officeDocument/2006/math">
                     <m:oMathParaPr>
@@ -5372,7 +5378,7 @@
             </p:txBody>
           </p:sp>
         </mc:Choice>
-        <mc:Fallback>
+        <mc:Fallback xmlns="">
           <p:sp>
             <p:nvSpPr>
               <p:cNvPr id="76" name="ZoneTexte 75"/>
@@ -5411,8 +5417,8 @@
           </p:sp>
         </mc:Fallback>
       </mc:AlternateContent>
-      <mc:AlternateContent xmlns:mc="http://schemas.openxmlformats.org/markup-compatibility/2006">
-        <mc:Choice xmlns:a14="http://schemas.microsoft.com/office/drawing/2010/main" Requires="a14">
+      <mc:AlternateContent xmlns:mc="http://schemas.openxmlformats.org/markup-compatibility/2006" xmlns:a14="http://schemas.microsoft.com/office/drawing/2010/main">
+        <mc:Choice Requires="a14">
           <p:sp>
             <p:nvSpPr>
               <p:cNvPr id="77" name="ZoneTexte 76"/>
@@ -5435,6 +5441,7 @@
               </a:bodyPr>
               <a:lstStyle/>
               <a:p>
+                <a:pPr/>
                 <a14:m>
                   <m:oMathPara xmlns:m="http://schemas.openxmlformats.org/officeDocument/2006/math">
                     <m:oMathParaPr>
@@ -5486,7 +5493,7 @@
             </p:txBody>
           </p:sp>
         </mc:Choice>
-        <mc:Fallback>
+        <mc:Fallback xmlns="">
           <p:sp>
             <p:nvSpPr>
               <p:cNvPr id="77" name="ZoneTexte 76"/>
@@ -5525,8 +5532,8 @@
           </p:sp>
         </mc:Fallback>
       </mc:AlternateContent>
-      <mc:AlternateContent xmlns:mc="http://schemas.openxmlformats.org/markup-compatibility/2006">
-        <mc:Choice xmlns:a14="http://schemas.microsoft.com/office/drawing/2010/main" Requires="a14">
+      <mc:AlternateContent xmlns:mc="http://schemas.openxmlformats.org/markup-compatibility/2006" xmlns:a14="http://schemas.microsoft.com/office/drawing/2010/main">
+        <mc:Choice Requires="a14">
           <p:sp>
             <p:nvSpPr>
               <p:cNvPr id="80" name="ZoneTexte 79"/>
@@ -5549,6 +5556,7 @@
               </a:bodyPr>
               <a:lstStyle/>
               <a:p>
+                <a:pPr/>
                 <a14:m>
                   <m:oMathPara xmlns:m="http://schemas.openxmlformats.org/officeDocument/2006/math">
                     <m:oMathParaPr>
@@ -5643,7 +5651,7 @@
             </p:txBody>
           </p:sp>
         </mc:Choice>
-        <mc:Fallback>
+        <mc:Fallback xmlns="">
           <p:sp>
             <p:nvSpPr>
               <p:cNvPr id="80" name="ZoneTexte 79"/>
@@ -5682,8 +5690,8 @@
           </p:sp>
         </mc:Fallback>
       </mc:AlternateContent>
-      <mc:AlternateContent xmlns:mc="http://schemas.openxmlformats.org/markup-compatibility/2006">
-        <mc:Choice xmlns:a14="http://schemas.microsoft.com/office/drawing/2010/main" Requires="a14">
+      <mc:AlternateContent xmlns:mc="http://schemas.openxmlformats.org/markup-compatibility/2006" xmlns:a14="http://schemas.microsoft.com/office/drawing/2010/main">
+        <mc:Choice Requires="a14">
           <p:sp>
             <p:nvSpPr>
               <p:cNvPr id="82" name="ZoneTexte 81"/>
@@ -5706,6 +5714,7 @@
               </a:bodyPr>
               <a:lstStyle/>
               <a:p>
+                <a:pPr/>
                 <a14:m>
                   <m:oMathPara xmlns:m="http://schemas.openxmlformats.org/officeDocument/2006/math">
                     <m:oMathParaPr>
@@ -5757,7 +5766,7 @@
             </p:txBody>
           </p:sp>
         </mc:Choice>
-        <mc:Fallback>
+        <mc:Fallback xmlns="">
           <p:sp>
             <p:nvSpPr>
               <p:cNvPr id="82" name="ZoneTexte 81"/>
@@ -5796,8 +5805,8 @@
           </p:sp>
         </mc:Fallback>
       </mc:AlternateContent>
-      <mc:AlternateContent xmlns:mc="http://schemas.openxmlformats.org/markup-compatibility/2006">
-        <mc:Choice xmlns:a14="http://schemas.microsoft.com/office/drawing/2010/main" Requires="a14">
+      <mc:AlternateContent xmlns:mc="http://schemas.openxmlformats.org/markup-compatibility/2006" xmlns:a14="http://schemas.microsoft.com/office/drawing/2010/main">
+        <mc:Choice Requires="a14">
           <p:sp>
             <p:nvSpPr>
               <p:cNvPr id="85" name="ZoneTexte 84"/>
@@ -5820,6 +5829,7 @@
               </a:bodyPr>
               <a:lstStyle/>
               <a:p>
+                <a:pPr/>
                 <a14:m>
                   <m:oMathPara xmlns:m="http://schemas.openxmlformats.org/officeDocument/2006/math">
                     <m:oMathParaPr>
@@ -5871,7 +5881,7 @@
             </p:txBody>
           </p:sp>
         </mc:Choice>
-        <mc:Fallback>
+        <mc:Fallback xmlns="">
           <p:sp>
             <p:nvSpPr>
               <p:cNvPr id="85" name="ZoneTexte 84"/>
@@ -6021,8 +6031,8 @@
           </a:fontRef>
         </p:style>
       </p:cxnSp>
-      <mc:AlternateContent xmlns:mc="http://schemas.openxmlformats.org/markup-compatibility/2006">
-        <mc:Choice xmlns:a14="http://schemas.microsoft.com/office/drawing/2010/main" Requires="a14">
+      <mc:AlternateContent xmlns:mc="http://schemas.openxmlformats.org/markup-compatibility/2006" xmlns:a14="http://schemas.microsoft.com/office/drawing/2010/main">
+        <mc:Choice Requires="a14">
           <p:sp>
             <p:nvSpPr>
               <p:cNvPr id="97" name="ZoneTexte 96"/>
@@ -6045,6 +6055,7 @@
               </a:bodyPr>
               <a:lstStyle/>
               <a:p>
+                <a:pPr/>
                 <a14:m>
                   <m:oMathPara xmlns:m="http://schemas.openxmlformats.org/officeDocument/2006/math">
                     <m:oMathParaPr>
@@ -6065,7 +6076,7 @@
             </p:txBody>
           </p:sp>
         </mc:Choice>
-        <mc:Fallback>
+        <mc:Fallback xmlns="">
           <p:sp>
             <p:nvSpPr>
               <p:cNvPr id="97" name="ZoneTexte 96"/>
@@ -6104,8 +6115,8 @@
           </p:sp>
         </mc:Fallback>
       </mc:AlternateContent>
-      <mc:AlternateContent xmlns:mc="http://schemas.openxmlformats.org/markup-compatibility/2006">
-        <mc:Choice xmlns:a14="http://schemas.microsoft.com/office/drawing/2010/main" Requires="a14">
+      <mc:AlternateContent xmlns:mc="http://schemas.openxmlformats.org/markup-compatibility/2006" xmlns:a14="http://schemas.microsoft.com/office/drawing/2010/main">
+        <mc:Choice Requires="a14">
           <p:sp>
             <p:nvSpPr>
               <p:cNvPr id="98" name="ZoneTexte 97"/>
@@ -6128,6 +6139,7 @@
               </a:bodyPr>
               <a:lstStyle/>
               <a:p>
+                <a:pPr/>
                 <a14:m>
                   <m:oMathPara xmlns:m="http://schemas.openxmlformats.org/officeDocument/2006/math">
                     <m:oMathParaPr>
@@ -6148,7 +6160,7 @@
             </p:txBody>
           </p:sp>
         </mc:Choice>
-        <mc:Fallback>
+        <mc:Fallback xmlns="">
           <p:sp>
             <p:nvSpPr>
               <p:cNvPr id="98" name="ZoneTexte 97"/>
@@ -6187,8 +6199,8 @@
           </p:sp>
         </mc:Fallback>
       </mc:AlternateContent>
-      <mc:AlternateContent xmlns:mc="http://schemas.openxmlformats.org/markup-compatibility/2006">
-        <mc:Choice xmlns:a14="http://schemas.microsoft.com/office/drawing/2010/main" Requires="a14">
+      <mc:AlternateContent xmlns:mc="http://schemas.openxmlformats.org/markup-compatibility/2006" xmlns:a14="http://schemas.microsoft.com/office/drawing/2010/main">
+        <mc:Choice Requires="a14">
           <p:sp>
             <p:nvSpPr>
               <p:cNvPr id="99" name="ZoneTexte 98"/>
@@ -6211,6 +6223,7 @@
               </a:bodyPr>
               <a:lstStyle/>
               <a:p>
+                <a:pPr/>
                 <a14:m>
                   <m:oMathPara xmlns:m="http://schemas.openxmlformats.org/officeDocument/2006/math">
                     <m:oMathParaPr>
@@ -6231,7 +6244,7 @@
             </p:txBody>
           </p:sp>
         </mc:Choice>
-        <mc:Fallback>
+        <mc:Fallback xmlns="">
           <p:sp>
             <p:nvSpPr>
               <p:cNvPr id="99" name="ZoneTexte 98"/>
@@ -6307,8 +6320,8 @@
           </a:fontRef>
         </p:style>
       </p:cxnSp>
-      <mc:AlternateContent xmlns:mc="http://schemas.openxmlformats.org/markup-compatibility/2006">
-        <mc:Choice xmlns:a14="http://schemas.microsoft.com/office/drawing/2010/main" Requires="a14">
+      <mc:AlternateContent xmlns:mc="http://schemas.openxmlformats.org/markup-compatibility/2006" xmlns:a14="http://schemas.microsoft.com/office/drawing/2010/main">
+        <mc:Choice Requires="a14">
           <p:sp>
             <p:nvSpPr>
               <p:cNvPr id="104" name="ZoneTexte 103"/>
@@ -6331,6 +6344,7 @@
               </a:bodyPr>
               <a:lstStyle/>
               <a:p>
+                <a:pPr/>
                 <a14:m>
                   <m:oMathPara xmlns:m="http://schemas.openxmlformats.org/officeDocument/2006/math">
                     <m:oMathParaPr>
@@ -6357,7 +6371,7 @@
             </p:txBody>
           </p:sp>
         </mc:Choice>
-        <mc:Fallback>
+        <mc:Fallback xmlns="">
           <p:sp>
             <p:nvSpPr>
               <p:cNvPr id="104" name="ZoneTexte 103"/>
@@ -6444,8 +6458,8 @@
           </a:p>
         </p:txBody>
       </p:sp>
-      <mc:AlternateContent xmlns:mc="http://schemas.openxmlformats.org/markup-compatibility/2006">
-        <mc:Choice xmlns:a14="http://schemas.microsoft.com/office/drawing/2010/main" Requires="a14">
+      <mc:AlternateContent xmlns:mc="http://schemas.openxmlformats.org/markup-compatibility/2006" xmlns:a14="http://schemas.microsoft.com/office/drawing/2010/main">
+        <mc:Choice Requires="a14">
           <p:sp>
             <p:nvSpPr>
               <p:cNvPr id="106" name="ZoneTexte 105"/>
@@ -6468,6 +6482,7 @@
               </a:bodyPr>
               <a:lstStyle/>
               <a:p>
+                <a:pPr/>
                 <a14:m>
                   <m:oMathPara xmlns:m="http://schemas.openxmlformats.org/officeDocument/2006/math">
                     <m:oMathParaPr>
@@ -6507,7 +6522,7 @@
             </p:txBody>
           </p:sp>
         </mc:Choice>
-        <mc:Fallback>
+        <mc:Fallback xmlns="">
           <p:sp>
             <p:nvSpPr>
               <p:cNvPr id="106" name="ZoneTexte 105"/>
@@ -6594,8 +6609,8 @@
           </a:p>
         </p:txBody>
       </p:sp>
-      <mc:AlternateContent xmlns:mc="http://schemas.openxmlformats.org/markup-compatibility/2006">
-        <mc:Choice xmlns:a14="http://schemas.microsoft.com/office/drawing/2010/main" Requires="a14">
+      <mc:AlternateContent xmlns:mc="http://schemas.openxmlformats.org/markup-compatibility/2006" xmlns:a14="http://schemas.microsoft.com/office/drawing/2010/main">
+        <mc:Choice Requires="a14">
           <p:sp>
             <p:nvSpPr>
               <p:cNvPr id="108" name="ZoneTexte 107"/>
@@ -6618,6 +6633,7 @@
               </a:bodyPr>
               <a:lstStyle/>
               <a:p>
+                <a:pPr/>
                 <a14:m>
                   <m:oMathPara xmlns:m="http://schemas.openxmlformats.org/officeDocument/2006/math">
                     <m:oMathParaPr>
@@ -6657,7 +6673,7 @@
             </p:txBody>
           </p:sp>
         </mc:Choice>
-        <mc:Fallback>
+        <mc:Fallback xmlns="">
           <p:sp>
             <p:nvSpPr>
               <p:cNvPr id="108" name="ZoneTexte 107"/>
@@ -6737,6 +6753,4405 @@
     <p:extLst>
       <p:ext uri="{BB962C8B-B14F-4D97-AF65-F5344CB8AC3E}">
         <p14:creationId xmlns:p14="http://schemas.microsoft.com/office/powerpoint/2010/main" val="3923583050"/>
+      </p:ext>
+    </p:extLst>
+  </p:cSld>
+  <p:clrMapOvr>
+    <a:masterClrMapping/>
+  </p:clrMapOvr>
+</p:sld>
+</file>
+
+<file path=ppt/slides/slide2.xml><?xml version="1.0" encoding="utf-8"?>
+<p:sld xmlns:a="http://schemas.openxmlformats.org/drawingml/2006/main" xmlns:r="http://schemas.openxmlformats.org/officeDocument/2006/relationships" xmlns:p="http://schemas.openxmlformats.org/presentationml/2006/main">
+  <p:cSld>
+    <p:spTree>
+      <p:nvGrpSpPr>
+        <p:cNvPr id="1" name=""/>
+        <p:cNvGrpSpPr/>
+        <p:nvPr/>
+      </p:nvGrpSpPr>
+      <p:grpSpPr>
+        <a:xfrm>
+          <a:off x="0" y="0"/>
+          <a:ext cx="0" cy="0"/>
+          <a:chOff x="0" y="0"/>
+          <a:chExt cx="0" cy="0"/>
+        </a:xfrm>
+      </p:grpSpPr>
+      <p:pic>
+        <p:nvPicPr>
+          <p:cNvPr id="1026" name="Picture 2"/>
+          <p:cNvPicPr>
+            <a:picLocks noChangeAspect="1" noChangeArrowheads="1"/>
+          </p:cNvPicPr>
+          <p:nvPr/>
+        </p:nvPicPr>
+        <p:blipFill>
+          <a:blip r:embed="rId2">
+            <a:extLst>
+              <a:ext uri="{28A0092B-C50C-407E-A947-70E740481C1C}">
+                <a14:useLocalDpi xmlns:a14="http://schemas.microsoft.com/office/drawing/2010/main" val="0"/>
+              </a:ext>
+            </a:extLst>
+          </a:blip>
+          <a:srcRect/>
+          <a:stretch>
+            <a:fillRect/>
+          </a:stretch>
+        </p:blipFill>
+        <p:spPr bwMode="auto">
+          <a:xfrm>
+            <a:off x="6574265" y="1585354"/>
+            <a:ext cx="2182812" cy="3425825"/>
+          </a:xfrm>
+          <a:prstGeom prst="rect">
+            <a:avLst/>
+          </a:prstGeom>
+          <a:noFill/>
+          <a:ln>
+            <a:noFill/>
+          </a:ln>
+          <a:effectLst/>
+          <a:extLst>
+            <a:ext uri="{909E8E84-426E-40DD-AFC4-6F175D3DCCD1}">
+              <a14:hiddenFill xmlns:a14="http://schemas.microsoft.com/office/drawing/2010/main">
+                <a:solidFill>
+                  <a:schemeClr val="accent1"/>
+                </a:solidFill>
+              </a14:hiddenFill>
+            </a:ext>
+            <a:ext uri="{91240B29-F687-4F45-9708-019B960494DF}">
+              <a14:hiddenLine xmlns:a14="http://schemas.microsoft.com/office/drawing/2010/main" w="9525">
+                <a:solidFill>
+                  <a:schemeClr val="tx1"/>
+                </a:solidFill>
+                <a:miter lim="800000"/>
+                <a:headEnd/>
+                <a:tailEnd/>
+              </a14:hiddenLine>
+            </a:ext>
+            <a:ext uri="{AF507438-7753-43E0-B8FC-AC1667EBCBE1}">
+              <a14:hiddenEffects xmlns:a14="http://schemas.microsoft.com/office/drawing/2010/main">
+                <a:effectLst>
+                  <a:outerShdw dist="35921" dir="2700000" algn="ctr" rotWithShape="0">
+                    <a:schemeClr val="bg2"/>
+                  </a:outerShdw>
+                </a:effectLst>
+              </a14:hiddenEffects>
+            </a:ext>
+          </a:extLst>
+        </p:spPr>
+      </p:pic>
+      <p:grpSp>
+        <p:nvGrpSpPr>
+          <p:cNvPr id="19" name="Groupe 18"/>
+          <p:cNvGrpSpPr/>
+          <p:nvPr/>
+        </p:nvGrpSpPr>
+        <p:grpSpPr>
+          <a:xfrm>
+            <a:off x="478794" y="2464311"/>
+            <a:ext cx="1480831" cy="1458804"/>
+            <a:chOff x="478794" y="2461736"/>
+            <a:chExt cx="1480831" cy="1458804"/>
+          </a:xfrm>
+        </p:grpSpPr>
+        <p:grpSp>
+          <p:nvGrpSpPr>
+            <p:cNvPr id="18" name="Groupe 17"/>
+            <p:cNvGrpSpPr/>
+            <p:nvPr/>
+          </p:nvGrpSpPr>
+          <p:grpSpPr>
+            <a:xfrm>
+              <a:off x="545902" y="2461736"/>
+              <a:ext cx="1413723" cy="1289971"/>
+              <a:chOff x="2713784" y="2468086"/>
+              <a:chExt cx="1413723" cy="1289971"/>
+            </a:xfrm>
+          </p:grpSpPr>
+          <mc:AlternateContent xmlns:mc="http://schemas.openxmlformats.org/markup-compatibility/2006">
+            <mc:Choice xmlns:a14="http://schemas.microsoft.com/office/drawing/2010/main" Requires="a14">
+              <p:sp>
+                <p:nvSpPr>
+                  <p:cNvPr id="6" name="ZoneTexte 5"/>
+                  <p:cNvSpPr txBox="1"/>
+                  <p:nvPr/>
+                </p:nvSpPr>
+                <p:spPr>
+                  <a:xfrm>
+                    <a:off x="3779912" y="3302042"/>
+                    <a:ext cx="347595" cy="253916"/>
+                  </a:xfrm>
+                  <a:prstGeom prst="rect">
+                    <a:avLst/>
+                  </a:prstGeom>
+                  <a:noFill/>
+                </p:spPr>
+                <p:txBody>
+                  <a:bodyPr wrap="none" rtlCol="0">
+                    <a:spAutoFit/>
+                  </a:bodyPr>
+                  <a:lstStyle/>
+                  <a:p>
+                    <a:pPr/>
+                    <a14:m>
+                      <m:oMathPara xmlns:m="http://schemas.openxmlformats.org/officeDocument/2006/math">
+                        <m:oMathParaPr>
+                          <m:jc m:val="centerGroup"/>
+                        </m:oMathParaPr>
+                        <m:oMath xmlns:m="http://schemas.openxmlformats.org/officeDocument/2006/math">
+                          <m:acc>
+                            <m:accPr>
+                              <m:chr m:val="⃗"/>
+                              <m:ctrlPr>
+                                <a:rPr lang="fr-FR" sz="1050" b="0" i="1" smtClean="0">
+                                  <a:latin typeface="Cambria Math"/>
+                                </a:rPr>
+                              </m:ctrlPr>
+                            </m:accPr>
+                            <m:e>
+                              <m:sSub>
+                                <m:sSubPr>
+                                  <m:ctrlPr>
+                                    <a:rPr lang="fr-FR" sz="1050" i="1">
+                                      <a:latin typeface="Cambria Math"/>
+                                    </a:rPr>
+                                  </m:ctrlPr>
+                                </m:sSubPr>
+                                <m:e>
+                                  <m:r>
+                                    <a:rPr lang="fr-FR" sz="1050" i="1">
+                                      <a:latin typeface="Cambria Math"/>
+                                    </a:rPr>
+                                    <m:t>𝑥</m:t>
+                                  </m:r>
+                                </m:e>
+                                <m:sub>
+                                  <m:r>
+                                    <a:rPr lang="fr-FR" sz="1050" b="0" i="1" smtClean="0">
+                                      <a:latin typeface="Cambria Math"/>
+                                    </a:rPr>
+                                    <m:t>0</m:t>
+                                  </m:r>
+                                </m:sub>
+                              </m:sSub>
+                            </m:e>
+                          </m:acc>
+                        </m:oMath>
+                      </m:oMathPara>
+                    </a14:m>
+                    <a:endParaRPr lang="fr-FR" sz="1050" dirty="0"/>
+                  </a:p>
+                </p:txBody>
+              </p:sp>
+            </mc:Choice>
+            <mc:Fallback>
+              <p:sp>
+                <p:nvSpPr>
+                  <p:cNvPr id="6" name="ZoneTexte 5"/>
+                  <p:cNvSpPr txBox="1">
+                    <a:spLocks noRot="1" noChangeAspect="1" noMove="1" noResize="1" noEditPoints="1" noAdjustHandles="1" noChangeArrowheads="1" noChangeShapeType="1" noTextEdit="1"/>
+                  </p:cNvSpPr>
+                  <p:nvPr/>
+                </p:nvSpPr>
+                <p:spPr>
+                  <a:xfrm>
+                    <a:off x="3779912" y="3302042"/>
+                    <a:ext cx="347595" cy="253916"/>
+                  </a:xfrm>
+                  <a:prstGeom prst="rect">
+                    <a:avLst/>
+                  </a:prstGeom>
+                  <a:blipFill rotWithShape="1">
+                    <a:blip r:embed="rId3"/>
+                    <a:stretch>
+                      <a:fillRect/>
+                    </a:stretch>
+                  </a:blipFill>
+                </p:spPr>
+                <p:txBody>
+                  <a:bodyPr/>
+                  <a:lstStyle/>
+                  <a:p>
+                    <a:r>
+                      <a:rPr lang="fr-FR">
+                        <a:noFill/>
+                      </a:rPr>
+                      <a:t> </a:t>
+                    </a:r>
+                  </a:p>
+                </p:txBody>
+              </p:sp>
+            </mc:Fallback>
+          </mc:AlternateContent>
+          <p:grpSp>
+            <p:nvGrpSpPr>
+              <p:cNvPr id="9" name="Groupe 8"/>
+              <p:cNvGrpSpPr/>
+              <p:nvPr/>
+            </p:nvGrpSpPr>
+            <p:grpSpPr>
+              <a:xfrm>
+                <a:off x="3131840" y="2722002"/>
+                <a:ext cx="706997" cy="706998"/>
+                <a:chOff x="3131840" y="2722002"/>
+                <a:chExt cx="706997" cy="706998"/>
+              </a:xfrm>
+            </p:grpSpPr>
+            <p:cxnSp>
+              <p:nvCxnSpPr>
+                <p:cNvPr id="5" name="Connecteur droit avec flèche 4"/>
+                <p:cNvCxnSpPr/>
+                <p:nvPr/>
+              </p:nvCxnSpPr>
+              <p:spPr>
+                <a:xfrm>
+                  <a:off x="3131840" y="3429000"/>
+                  <a:ext cx="706997" cy="0"/>
+                </a:xfrm>
+                <a:prstGeom prst="straightConnector1">
+                  <a:avLst/>
+                </a:prstGeom>
+                <a:ln w="12700">
+                  <a:solidFill>
+                    <a:schemeClr val="accent5">
+                      <a:lumMod val="50000"/>
+                    </a:schemeClr>
+                  </a:solidFill>
+                  <a:tailEnd type="stealth" w="med" len="lg"/>
+                </a:ln>
+              </p:spPr>
+              <p:style>
+                <a:lnRef idx="1">
+                  <a:schemeClr val="accent1"/>
+                </a:lnRef>
+                <a:fillRef idx="0">
+                  <a:schemeClr val="accent1"/>
+                </a:fillRef>
+                <a:effectRef idx="0">
+                  <a:schemeClr val="accent1"/>
+                </a:effectRef>
+                <a:fontRef idx="minor">
+                  <a:schemeClr val="tx1"/>
+                </a:fontRef>
+              </p:style>
+            </p:cxnSp>
+            <p:cxnSp>
+              <p:nvCxnSpPr>
+                <p:cNvPr id="7" name="Connecteur droit avec flèche 6"/>
+                <p:cNvCxnSpPr/>
+                <p:nvPr/>
+              </p:nvCxnSpPr>
+              <p:spPr>
+                <a:xfrm rot="16200000">
+                  <a:off x="2778342" y="3075501"/>
+                  <a:ext cx="706997" cy="0"/>
+                </a:xfrm>
+                <a:prstGeom prst="straightConnector1">
+                  <a:avLst/>
+                </a:prstGeom>
+                <a:ln w="12700">
+                  <a:solidFill>
+                    <a:schemeClr val="accent5">
+                      <a:lumMod val="50000"/>
+                    </a:schemeClr>
+                  </a:solidFill>
+                  <a:tailEnd type="stealth" w="med" len="lg"/>
+                </a:ln>
+              </p:spPr>
+              <p:style>
+                <a:lnRef idx="1">
+                  <a:schemeClr val="accent1"/>
+                </a:lnRef>
+                <a:fillRef idx="0">
+                  <a:schemeClr val="accent1"/>
+                </a:fillRef>
+                <a:effectRef idx="0">
+                  <a:schemeClr val="accent1"/>
+                </a:effectRef>
+                <a:fontRef idx="minor">
+                  <a:schemeClr val="tx1"/>
+                </a:fontRef>
+              </p:style>
+            </p:cxnSp>
+          </p:grpSp>
+          <mc:AlternateContent xmlns:mc="http://schemas.openxmlformats.org/markup-compatibility/2006">
+            <mc:Choice xmlns:a14="http://schemas.microsoft.com/office/drawing/2010/main" Requires="a14">
+              <p:sp>
+                <p:nvSpPr>
+                  <p:cNvPr id="8" name="ZoneTexte 7"/>
+                  <p:cNvSpPr txBox="1"/>
+                  <p:nvPr/>
+                </p:nvSpPr>
+                <p:spPr>
+                  <a:xfrm>
+                    <a:off x="2959613" y="2468086"/>
+                    <a:ext cx="348044" cy="253916"/>
+                  </a:xfrm>
+                  <a:prstGeom prst="rect">
+                    <a:avLst/>
+                  </a:prstGeom>
+                  <a:noFill/>
+                </p:spPr>
+                <p:txBody>
+                  <a:bodyPr wrap="none" rtlCol="0">
+                    <a:spAutoFit/>
+                  </a:bodyPr>
+                  <a:lstStyle/>
+                  <a:p>
+                    <a:pPr/>
+                    <a14:m>
+                      <m:oMathPara xmlns:m="http://schemas.openxmlformats.org/officeDocument/2006/math">
+                        <m:oMathParaPr>
+                          <m:jc m:val="centerGroup"/>
+                        </m:oMathParaPr>
+                        <m:oMath xmlns:m="http://schemas.openxmlformats.org/officeDocument/2006/math">
+                          <m:acc>
+                            <m:accPr>
+                              <m:chr m:val="⃗"/>
+                              <m:ctrlPr>
+                                <a:rPr lang="fr-FR" sz="1050" b="0" i="1" smtClean="0">
+                                  <a:latin typeface="Cambria Math"/>
+                                </a:rPr>
+                              </m:ctrlPr>
+                            </m:accPr>
+                            <m:e>
+                              <m:sSub>
+                                <m:sSubPr>
+                                  <m:ctrlPr>
+                                    <a:rPr lang="fr-FR" sz="1050" i="1">
+                                      <a:latin typeface="Cambria Math"/>
+                                    </a:rPr>
+                                  </m:ctrlPr>
+                                </m:sSubPr>
+                                <m:e>
+                                  <m:r>
+                                    <a:rPr lang="fr-FR" sz="1050" b="0" i="1" smtClean="0">
+                                      <a:latin typeface="Cambria Math"/>
+                                    </a:rPr>
+                                    <m:t>𝑦</m:t>
+                                  </m:r>
+                                </m:e>
+                                <m:sub>
+                                  <m:r>
+                                    <a:rPr lang="fr-FR" sz="1050" b="0" i="1" smtClean="0">
+                                      <a:latin typeface="Cambria Math"/>
+                                    </a:rPr>
+                                    <m:t>0</m:t>
+                                  </m:r>
+                                </m:sub>
+                              </m:sSub>
+                            </m:e>
+                          </m:acc>
+                        </m:oMath>
+                      </m:oMathPara>
+                    </a14:m>
+                    <a:endParaRPr lang="fr-FR" sz="1050" dirty="0"/>
+                  </a:p>
+                </p:txBody>
+              </p:sp>
+            </mc:Choice>
+            <mc:Fallback>
+              <p:sp>
+                <p:nvSpPr>
+                  <p:cNvPr id="8" name="ZoneTexte 7"/>
+                  <p:cNvSpPr txBox="1">
+                    <a:spLocks noRot="1" noChangeAspect="1" noMove="1" noResize="1" noEditPoints="1" noAdjustHandles="1" noChangeArrowheads="1" noChangeShapeType="1" noTextEdit="1"/>
+                  </p:cNvSpPr>
+                  <p:nvPr/>
+                </p:nvSpPr>
+                <p:spPr>
+                  <a:xfrm>
+                    <a:off x="2959613" y="2468086"/>
+                    <a:ext cx="348044" cy="253916"/>
+                  </a:xfrm>
+                  <a:prstGeom prst="rect">
+                    <a:avLst/>
+                  </a:prstGeom>
+                  <a:blipFill rotWithShape="1">
+                    <a:blip r:embed="rId4"/>
+                    <a:stretch>
+                      <a:fillRect/>
+                    </a:stretch>
+                  </a:blipFill>
+                </p:spPr>
+                <p:txBody>
+                  <a:bodyPr/>
+                  <a:lstStyle/>
+                  <a:p>
+                    <a:r>
+                      <a:rPr lang="fr-FR">
+                        <a:noFill/>
+                      </a:rPr>
+                      <a:t> </a:t>
+                    </a:r>
+                  </a:p>
+                </p:txBody>
+              </p:sp>
+            </mc:Fallback>
+          </mc:AlternateContent>
+          <p:grpSp>
+            <p:nvGrpSpPr>
+              <p:cNvPr id="10" name="Groupe 9"/>
+              <p:cNvGrpSpPr/>
+              <p:nvPr/>
+            </p:nvGrpSpPr>
+            <p:grpSpPr>
+              <a:xfrm rot="20700000">
+                <a:off x="3034278" y="2642555"/>
+                <a:ext cx="706997" cy="706998"/>
+                <a:chOff x="3131840" y="2722002"/>
+                <a:chExt cx="706997" cy="706998"/>
+              </a:xfrm>
+            </p:grpSpPr>
+            <p:cxnSp>
+              <p:nvCxnSpPr>
+                <p:cNvPr id="11" name="Connecteur droit avec flèche 10"/>
+                <p:cNvCxnSpPr/>
+                <p:nvPr/>
+              </p:nvCxnSpPr>
+              <p:spPr>
+                <a:xfrm>
+                  <a:off x="3131840" y="3429000"/>
+                  <a:ext cx="706997" cy="0"/>
+                </a:xfrm>
+                <a:prstGeom prst="straightConnector1">
+                  <a:avLst/>
+                </a:prstGeom>
+                <a:ln w="12700">
+                  <a:solidFill>
+                    <a:srgbClr val="7030A0"/>
+                  </a:solidFill>
+                  <a:tailEnd type="stealth" w="med" len="lg"/>
+                </a:ln>
+              </p:spPr>
+              <p:style>
+                <a:lnRef idx="1">
+                  <a:schemeClr val="accent1"/>
+                </a:lnRef>
+                <a:fillRef idx="0">
+                  <a:schemeClr val="accent1"/>
+                </a:fillRef>
+                <a:effectRef idx="0">
+                  <a:schemeClr val="accent1"/>
+                </a:effectRef>
+                <a:fontRef idx="minor">
+                  <a:schemeClr val="tx1"/>
+                </a:fontRef>
+              </p:style>
+            </p:cxnSp>
+            <p:cxnSp>
+              <p:nvCxnSpPr>
+                <p:cNvPr id="12" name="Connecteur droit avec flèche 11"/>
+                <p:cNvCxnSpPr/>
+                <p:nvPr/>
+              </p:nvCxnSpPr>
+              <p:spPr>
+                <a:xfrm rot="16200000">
+                  <a:off x="2778342" y="3075501"/>
+                  <a:ext cx="706997" cy="0"/>
+                </a:xfrm>
+                <a:prstGeom prst="straightConnector1">
+                  <a:avLst/>
+                </a:prstGeom>
+                <a:ln w="12700">
+                  <a:solidFill>
+                    <a:srgbClr val="7030A0"/>
+                  </a:solidFill>
+                  <a:tailEnd type="stealth" w="med" len="lg"/>
+                </a:ln>
+              </p:spPr>
+              <p:style>
+                <a:lnRef idx="1">
+                  <a:schemeClr val="accent1"/>
+                </a:lnRef>
+                <a:fillRef idx="0">
+                  <a:schemeClr val="accent1"/>
+                </a:fillRef>
+                <a:effectRef idx="0">
+                  <a:schemeClr val="accent1"/>
+                </a:effectRef>
+                <a:fontRef idx="minor">
+                  <a:schemeClr val="tx1"/>
+                </a:fontRef>
+              </p:style>
+            </p:cxnSp>
+          </p:grpSp>
+          <mc:AlternateContent xmlns:mc="http://schemas.openxmlformats.org/markup-compatibility/2006">
+            <mc:Choice xmlns:a14="http://schemas.microsoft.com/office/drawing/2010/main" Requires="a14">
+              <p:sp>
+                <p:nvSpPr>
+                  <p:cNvPr id="13" name="ZoneTexte 12"/>
+                  <p:cNvSpPr txBox="1"/>
+                  <p:nvPr/>
+                </p:nvSpPr>
+                <p:spPr>
+                  <a:xfrm>
+                    <a:off x="3779912" y="3099143"/>
+                    <a:ext cx="344453" cy="253916"/>
+                  </a:xfrm>
+                  <a:prstGeom prst="rect">
+                    <a:avLst/>
+                  </a:prstGeom>
+                  <a:noFill/>
+                </p:spPr>
+                <p:txBody>
+                  <a:bodyPr wrap="none" rtlCol="0">
+                    <a:spAutoFit/>
+                  </a:bodyPr>
+                  <a:lstStyle/>
+                  <a:p>
+                    <a:pPr/>
+                    <a14:m>
+                      <m:oMathPara xmlns:m="http://schemas.openxmlformats.org/officeDocument/2006/math">
+                        <m:oMathParaPr>
+                          <m:jc m:val="centerGroup"/>
+                        </m:oMathParaPr>
+                        <m:oMath xmlns:m="http://schemas.openxmlformats.org/officeDocument/2006/math">
+                          <m:acc>
+                            <m:accPr>
+                              <m:chr m:val="⃗"/>
+                              <m:ctrlPr>
+                                <a:rPr lang="fr-FR" sz="1050" b="0" i="1" smtClean="0">
+                                  <a:latin typeface="Cambria Math"/>
+                                </a:rPr>
+                              </m:ctrlPr>
+                            </m:accPr>
+                            <m:e>
+                              <m:sSub>
+                                <m:sSubPr>
+                                  <m:ctrlPr>
+                                    <a:rPr lang="fr-FR" sz="1050" i="1">
+                                      <a:latin typeface="Cambria Math"/>
+                                    </a:rPr>
+                                  </m:ctrlPr>
+                                </m:sSubPr>
+                                <m:e>
+                                  <m:r>
+                                    <a:rPr lang="fr-FR" sz="1050" i="1">
+                                      <a:latin typeface="Cambria Math"/>
+                                    </a:rPr>
+                                    <m:t>𝑥</m:t>
+                                  </m:r>
+                                </m:e>
+                                <m:sub>
+                                  <m:r>
+                                    <a:rPr lang="fr-FR" sz="1050" b="0" i="1" smtClean="0">
+                                      <a:latin typeface="Cambria Math"/>
+                                    </a:rPr>
+                                    <m:t>1</m:t>
+                                  </m:r>
+                                </m:sub>
+                              </m:sSub>
+                            </m:e>
+                          </m:acc>
+                        </m:oMath>
+                      </m:oMathPara>
+                    </a14:m>
+                    <a:endParaRPr lang="fr-FR" sz="1050" dirty="0"/>
+                  </a:p>
+                </p:txBody>
+              </p:sp>
+            </mc:Choice>
+            <mc:Fallback>
+              <p:sp>
+                <p:nvSpPr>
+                  <p:cNvPr id="13" name="ZoneTexte 12"/>
+                  <p:cNvSpPr txBox="1">
+                    <a:spLocks noRot="1" noChangeAspect="1" noMove="1" noResize="1" noEditPoints="1" noAdjustHandles="1" noChangeArrowheads="1" noChangeShapeType="1" noTextEdit="1"/>
+                  </p:cNvSpPr>
+                  <p:nvPr/>
+                </p:nvSpPr>
+                <p:spPr>
+                  <a:xfrm>
+                    <a:off x="3779912" y="3099143"/>
+                    <a:ext cx="344453" cy="253916"/>
+                  </a:xfrm>
+                  <a:prstGeom prst="rect">
+                    <a:avLst/>
+                  </a:prstGeom>
+                  <a:blipFill rotWithShape="1">
+                    <a:blip r:embed="rId5"/>
+                    <a:stretch>
+                      <a:fillRect/>
+                    </a:stretch>
+                  </a:blipFill>
+                </p:spPr>
+                <p:txBody>
+                  <a:bodyPr/>
+                  <a:lstStyle/>
+                  <a:p>
+                    <a:r>
+                      <a:rPr lang="fr-FR">
+                        <a:noFill/>
+                      </a:rPr>
+                      <a:t> </a:t>
+                    </a:r>
+                  </a:p>
+                </p:txBody>
+              </p:sp>
+            </mc:Fallback>
+          </mc:AlternateContent>
+          <mc:AlternateContent xmlns:mc="http://schemas.openxmlformats.org/markup-compatibility/2006">
+            <mc:Choice xmlns:a14="http://schemas.microsoft.com/office/drawing/2010/main" Requires="a14">
+              <p:sp>
+                <p:nvSpPr>
+                  <p:cNvPr id="14" name="ZoneTexte 13"/>
+                  <p:cNvSpPr txBox="1"/>
+                  <p:nvPr/>
+                </p:nvSpPr>
+                <p:spPr>
+                  <a:xfrm>
+                    <a:off x="2713784" y="2487180"/>
+                    <a:ext cx="344902" cy="253916"/>
+                  </a:xfrm>
+                  <a:prstGeom prst="rect">
+                    <a:avLst/>
+                  </a:prstGeom>
+                  <a:noFill/>
+                </p:spPr>
+                <p:txBody>
+                  <a:bodyPr wrap="none" rtlCol="0">
+                    <a:spAutoFit/>
+                  </a:bodyPr>
+                  <a:lstStyle/>
+                  <a:p>
+                    <a:pPr/>
+                    <a14:m>
+                      <m:oMathPara xmlns:m="http://schemas.openxmlformats.org/officeDocument/2006/math">
+                        <m:oMathParaPr>
+                          <m:jc m:val="centerGroup"/>
+                        </m:oMathParaPr>
+                        <m:oMath xmlns:m="http://schemas.openxmlformats.org/officeDocument/2006/math">
+                          <m:acc>
+                            <m:accPr>
+                              <m:chr m:val="⃗"/>
+                              <m:ctrlPr>
+                                <a:rPr lang="fr-FR" sz="1050" b="0" i="1" smtClean="0">
+                                  <a:latin typeface="Cambria Math"/>
+                                </a:rPr>
+                              </m:ctrlPr>
+                            </m:accPr>
+                            <m:e>
+                              <m:sSub>
+                                <m:sSubPr>
+                                  <m:ctrlPr>
+                                    <a:rPr lang="fr-FR" sz="1050" i="1">
+                                      <a:latin typeface="Cambria Math"/>
+                                    </a:rPr>
+                                  </m:ctrlPr>
+                                </m:sSubPr>
+                                <m:e>
+                                  <m:r>
+                                    <a:rPr lang="fr-FR" sz="1050" b="0" i="1" smtClean="0">
+                                      <a:latin typeface="Cambria Math"/>
+                                    </a:rPr>
+                                    <m:t>𝑦</m:t>
+                                  </m:r>
+                                </m:e>
+                                <m:sub>
+                                  <m:r>
+                                    <a:rPr lang="fr-FR" sz="1050" b="0" i="1" smtClean="0">
+                                      <a:latin typeface="Cambria Math"/>
+                                    </a:rPr>
+                                    <m:t>1</m:t>
+                                  </m:r>
+                                </m:sub>
+                              </m:sSub>
+                            </m:e>
+                          </m:acc>
+                        </m:oMath>
+                      </m:oMathPara>
+                    </a14:m>
+                    <a:endParaRPr lang="fr-FR" sz="1050" dirty="0"/>
+                  </a:p>
+                </p:txBody>
+              </p:sp>
+            </mc:Choice>
+            <mc:Fallback>
+              <p:sp>
+                <p:nvSpPr>
+                  <p:cNvPr id="14" name="ZoneTexte 13"/>
+                  <p:cNvSpPr txBox="1">
+                    <a:spLocks noRot="1" noChangeAspect="1" noMove="1" noResize="1" noEditPoints="1" noAdjustHandles="1" noChangeArrowheads="1" noChangeShapeType="1" noTextEdit="1"/>
+                  </p:cNvSpPr>
+                  <p:nvPr/>
+                </p:nvSpPr>
+                <p:spPr>
+                  <a:xfrm>
+                    <a:off x="2713784" y="2487180"/>
+                    <a:ext cx="344902" cy="253916"/>
+                  </a:xfrm>
+                  <a:prstGeom prst="rect">
+                    <a:avLst/>
+                  </a:prstGeom>
+                  <a:blipFill rotWithShape="1">
+                    <a:blip r:embed="rId6"/>
+                    <a:stretch>
+                      <a:fillRect/>
+                    </a:stretch>
+                  </a:blipFill>
+                </p:spPr>
+                <p:txBody>
+                  <a:bodyPr/>
+                  <a:lstStyle/>
+                  <a:p>
+                    <a:r>
+                      <a:rPr lang="fr-FR">
+                        <a:noFill/>
+                      </a:rPr>
+                      <a:t> </a:t>
+                    </a:r>
+                  </a:p>
+                </p:txBody>
+              </p:sp>
+            </mc:Fallback>
+          </mc:AlternateContent>
+          <p:sp>
+            <p:nvSpPr>
+              <p:cNvPr id="15" name="Ellipse 14"/>
+              <p:cNvSpPr/>
+              <p:nvPr/>
+            </p:nvSpPr>
+            <p:spPr>
+              <a:xfrm>
+                <a:off x="3061828" y="3356992"/>
+                <a:ext cx="144016" cy="144016"/>
+              </a:xfrm>
+              <a:prstGeom prst="ellipse">
+                <a:avLst/>
+              </a:prstGeom>
+              <a:solidFill>
+                <a:schemeClr val="bg1"/>
+              </a:solidFill>
+              <a:ln w="12700">
+                <a:solidFill>
+                  <a:srgbClr val="7030A0"/>
+                </a:solidFill>
+                <a:tailEnd type="stealth" w="med" len="lg"/>
+              </a:ln>
+            </p:spPr>
+            <p:style>
+              <a:lnRef idx="1">
+                <a:schemeClr val="accent1"/>
+              </a:lnRef>
+              <a:fillRef idx="0">
+                <a:schemeClr val="accent1"/>
+              </a:fillRef>
+              <a:effectRef idx="0">
+                <a:schemeClr val="accent1"/>
+              </a:effectRef>
+              <a:fontRef idx="minor">
+                <a:schemeClr val="tx1"/>
+              </a:fontRef>
+            </p:style>
+            <p:txBody>
+              <a:bodyPr rtlCol="0" anchor="ctr"/>
+              <a:lstStyle/>
+              <a:p>
+                <a:pPr algn="ctr"/>
+                <a:endParaRPr lang="fr-FR"/>
+              </a:p>
+            </p:txBody>
+          </p:sp>
+          <p:sp>
+            <p:nvSpPr>
+              <p:cNvPr id="16" name="Ellipse 15"/>
+              <p:cNvSpPr/>
+              <p:nvPr/>
+            </p:nvSpPr>
+            <p:spPr>
+              <a:xfrm>
+                <a:off x="3106398" y="3403558"/>
+                <a:ext cx="50884" cy="50884"/>
+              </a:xfrm>
+              <a:prstGeom prst="ellipse">
+                <a:avLst/>
+              </a:prstGeom>
+              <a:solidFill>
+                <a:srgbClr val="7030A0"/>
+              </a:solidFill>
+              <a:ln w="12700">
+                <a:solidFill>
+                  <a:srgbClr val="7030A0"/>
+                </a:solidFill>
+                <a:tailEnd type="stealth" w="med" len="lg"/>
+              </a:ln>
+            </p:spPr>
+            <p:style>
+              <a:lnRef idx="1">
+                <a:schemeClr val="accent1"/>
+              </a:lnRef>
+              <a:fillRef idx="0">
+                <a:schemeClr val="accent1"/>
+              </a:fillRef>
+              <a:effectRef idx="0">
+                <a:schemeClr val="accent1"/>
+              </a:effectRef>
+              <a:fontRef idx="minor">
+                <a:schemeClr val="tx1"/>
+              </a:fontRef>
+            </p:style>
+            <p:txBody>
+              <a:bodyPr rtlCol="0" anchor="ctr"/>
+              <a:lstStyle/>
+              <a:p>
+                <a:pPr algn="ctr"/>
+                <a:endParaRPr lang="fr-FR"/>
+              </a:p>
+            </p:txBody>
+          </p:sp>
+          <mc:AlternateContent xmlns:mc="http://schemas.openxmlformats.org/markup-compatibility/2006">
+            <mc:Choice xmlns:a14="http://schemas.microsoft.com/office/drawing/2010/main" Requires="a14">
+              <p:sp>
+                <p:nvSpPr>
+                  <p:cNvPr id="17" name="ZoneTexte 16"/>
+                  <p:cNvSpPr txBox="1"/>
+                  <p:nvPr/>
+                </p:nvSpPr>
+                <p:spPr>
+                  <a:xfrm>
+                    <a:off x="2782604" y="3504141"/>
+                    <a:ext cx="637268" cy="253916"/>
+                  </a:xfrm>
+                  <a:prstGeom prst="rect">
+                    <a:avLst/>
+                  </a:prstGeom>
+                  <a:noFill/>
+                </p:spPr>
+                <p:txBody>
+                  <a:bodyPr wrap="square" rtlCol="0">
+                    <a:spAutoFit/>
+                  </a:bodyPr>
+                  <a:lstStyle/>
+                  <a:p>
+                    <a14:m>
+                      <m:oMathPara xmlns:m="http://schemas.openxmlformats.org/officeDocument/2006/math">
+                        <m:oMathParaPr>
+                          <m:jc m:val="centerGroup"/>
+                        </m:oMathParaPr>
+                        <m:oMath xmlns:m="http://schemas.openxmlformats.org/officeDocument/2006/math">
+                          <m:acc>
+                            <m:accPr>
+                              <m:chr m:val="⃗"/>
+                              <m:ctrlPr>
+                                <a:rPr lang="fr-FR" sz="1050" i="1" smtClean="0">
+                                  <a:latin typeface="Cambria Math"/>
+                                </a:rPr>
+                              </m:ctrlPr>
+                            </m:accPr>
+                            <m:e>
+                              <m:sSub>
+                                <m:sSubPr>
+                                  <m:ctrlPr>
+                                    <a:rPr lang="fr-FR" sz="1050" i="1">
+                                      <a:latin typeface="Cambria Math"/>
+                                    </a:rPr>
+                                  </m:ctrlPr>
+                                </m:sSubPr>
+                                <m:e>
+                                  <m:r>
+                                    <a:rPr lang="fr-FR" sz="1050" i="1">
+                                      <a:latin typeface="Cambria Math"/>
+                                    </a:rPr>
+                                    <m:t>𝑧</m:t>
+                                  </m:r>
+                                </m:e>
+                                <m:sub>
+                                  <m:r>
+                                    <a:rPr lang="fr-FR" sz="1050" b="0" i="1" smtClean="0">
+                                      <a:latin typeface="Cambria Math"/>
+                                    </a:rPr>
+                                    <m:t>0</m:t>
+                                  </m:r>
+                                </m:sub>
+                              </m:sSub>
+                            </m:e>
+                          </m:acc>
+                          <m:r>
+                            <a:rPr lang="fr-FR" sz="1050" b="0" i="0" smtClean="0">
+                              <a:latin typeface="Cambria Math"/>
+                            </a:rPr>
+                            <m:t>=</m:t>
+                          </m:r>
+                          <m:acc>
+                            <m:accPr>
+                              <m:chr m:val="⃗"/>
+                              <m:ctrlPr>
+                                <a:rPr lang="fr-FR" sz="1050" b="0" i="1" smtClean="0">
+                                  <a:latin typeface="Cambria Math"/>
+                                </a:rPr>
+                              </m:ctrlPr>
+                            </m:accPr>
+                            <m:e>
+                              <m:sSub>
+                                <m:sSubPr>
+                                  <m:ctrlPr>
+                                    <a:rPr lang="fr-FR" sz="1050" i="1">
+                                      <a:latin typeface="Cambria Math"/>
+                                    </a:rPr>
+                                  </m:ctrlPr>
+                                </m:sSubPr>
+                                <m:e>
+                                  <m:r>
+                                    <a:rPr lang="fr-FR" sz="1050" b="0" i="1" smtClean="0">
+                                      <a:latin typeface="Cambria Math"/>
+                                    </a:rPr>
+                                    <m:t>𝑧</m:t>
+                                  </m:r>
+                                </m:e>
+                                <m:sub>
+                                  <m:r>
+                                    <a:rPr lang="fr-FR" sz="1050" i="1">
+                                      <a:latin typeface="Cambria Math"/>
+                                    </a:rPr>
+                                    <m:t>1</m:t>
+                                  </m:r>
+                                </m:sub>
+                              </m:sSub>
+                            </m:e>
+                          </m:acc>
+                        </m:oMath>
+                      </m:oMathPara>
+                    </a14:m>
+                    <a:endParaRPr lang="fr-FR" sz="1050" dirty="0"/>
+                  </a:p>
+                </p:txBody>
+              </p:sp>
+            </mc:Choice>
+            <mc:Fallback>
+              <p:sp>
+                <p:nvSpPr>
+                  <p:cNvPr id="17" name="ZoneTexte 16"/>
+                  <p:cNvSpPr txBox="1">
+                    <a:spLocks noRot="1" noChangeAspect="1" noMove="1" noResize="1" noEditPoints="1" noAdjustHandles="1" noChangeArrowheads="1" noChangeShapeType="1" noTextEdit="1"/>
+                  </p:cNvSpPr>
+                  <p:nvPr/>
+                </p:nvSpPr>
+                <p:spPr>
+                  <a:xfrm>
+                    <a:off x="2782604" y="3504141"/>
+                    <a:ext cx="637268" cy="253916"/>
+                  </a:xfrm>
+                  <a:prstGeom prst="rect">
+                    <a:avLst/>
+                  </a:prstGeom>
+                  <a:blipFill rotWithShape="1">
+                    <a:blip r:embed="rId7"/>
+                    <a:stretch>
+                      <a:fillRect/>
+                    </a:stretch>
+                  </a:blipFill>
+                </p:spPr>
+                <p:txBody>
+                  <a:bodyPr/>
+                  <a:lstStyle/>
+                  <a:p>
+                    <a:r>
+                      <a:rPr lang="fr-FR">
+                        <a:noFill/>
+                      </a:rPr>
+                      <a:t> </a:t>
+                    </a:r>
+                  </a:p>
+                </p:txBody>
+              </p:sp>
+            </mc:Fallback>
+          </mc:AlternateContent>
+        </p:grpSp>
+        <p:sp>
+          <p:nvSpPr>
+            <p:cNvPr id="20" name="Arc 19"/>
+            <p:cNvSpPr/>
+            <p:nvPr/>
+          </p:nvSpPr>
+          <p:spPr>
+            <a:xfrm>
+              <a:off x="478794" y="2940802"/>
+              <a:ext cx="979738" cy="979738"/>
+            </a:xfrm>
+            <a:prstGeom prst="arc">
+              <a:avLst>
+                <a:gd name="adj1" fmla="val 20515322"/>
+                <a:gd name="adj2" fmla="val 0"/>
+              </a:avLst>
+            </a:prstGeom>
+            <a:ln w="12700">
+              <a:solidFill>
+                <a:srgbClr val="7030A0"/>
+              </a:solidFill>
+              <a:headEnd type="stealth" w="sm" len="med"/>
+              <a:tailEnd type="none" w="med" len="lg"/>
+            </a:ln>
+          </p:spPr>
+          <p:style>
+            <a:lnRef idx="1">
+              <a:schemeClr val="accent1"/>
+            </a:lnRef>
+            <a:fillRef idx="0">
+              <a:schemeClr val="accent1"/>
+            </a:fillRef>
+            <a:effectRef idx="0">
+              <a:schemeClr val="accent1"/>
+            </a:effectRef>
+            <a:fontRef idx="minor">
+              <a:schemeClr val="tx1"/>
+            </a:fontRef>
+          </p:style>
+          <p:txBody>
+            <a:bodyPr rtlCol="0" anchor="ctr"/>
+            <a:lstStyle/>
+            <a:p>
+              <a:pPr algn="ctr"/>
+              <a:endParaRPr lang="fr-FR">
+                <a:solidFill>
+                  <a:srgbClr val="7030A0"/>
+                </a:solidFill>
+              </a:endParaRPr>
+            </a:p>
+          </p:txBody>
+        </p:sp>
+        <mc:AlternateContent xmlns:mc="http://schemas.openxmlformats.org/markup-compatibility/2006">
+          <mc:Choice xmlns:a14="http://schemas.microsoft.com/office/drawing/2010/main" Requires="a14">
+            <p:sp>
+              <p:nvSpPr>
+                <p:cNvPr id="21" name="ZoneTexte 20"/>
+                <p:cNvSpPr txBox="1"/>
+                <p:nvPr/>
+              </p:nvSpPr>
+              <p:spPr>
+                <a:xfrm>
+                  <a:off x="1318173" y="3106208"/>
+                  <a:ext cx="280718" cy="215444"/>
+                </a:xfrm>
+                <a:prstGeom prst="rect">
+                  <a:avLst/>
+                </a:prstGeom>
+                <a:noFill/>
+              </p:spPr>
+              <p:txBody>
+                <a:bodyPr wrap="none" rtlCol="0">
+                  <a:spAutoFit/>
+                </a:bodyPr>
+                <a:lstStyle/>
+                <a:p>
+                  <a:pPr/>
+                  <a14:m>
+                    <m:oMathPara xmlns:m="http://schemas.openxmlformats.org/officeDocument/2006/math">
+                      <m:oMathParaPr>
+                        <m:jc m:val="centerGroup"/>
+                      </m:oMathParaPr>
+                      <m:oMath xmlns:m="http://schemas.openxmlformats.org/officeDocument/2006/math">
+                        <m:r>
+                          <a:rPr lang="fr-FR" sz="800" b="0" i="1" smtClean="0">
+                            <a:latin typeface="Cambria Math"/>
+                          </a:rPr>
+                          <m:t>𝜓</m:t>
+                        </m:r>
+                      </m:oMath>
+                    </m:oMathPara>
+                  </a14:m>
+                  <a:endParaRPr lang="fr-FR" sz="800" dirty="0"/>
+                </a:p>
+              </p:txBody>
+            </p:sp>
+          </mc:Choice>
+          <mc:Fallback>
+            <p:sp>
+              <p:nvSpPr>
+                <p:cNvPr id="21" name="ZoneTexte 20"/>
+                <p:cNvSpPr txBox="1">
+                  <a:spLocks noRot="1" noChangeAspect="1" noMove="1" noResize="1" noEditPoints="1" noAdjustHandles="1" noChangeArrowheads="1" noChangeShapeType="1" noTextEdit="1"/>
+                </p:cNvSpPr>
+                <p:nvPr/>
+              </p:nvSpPr>
+              <p:spPr>
+                <a:xfrm>
+                  <a:off x="1318173" y="3106208"/>
+                  <a:ext cx="280718" cy="215444"/>
+                </a:xfrm>
+                <a:prstGeom prst="rect">
+                  <a:avLst/>
+                </a:prstGeom>
+                <a:blipFill rotWithShape="1">
+                  <a:blip r:embed="rId8"/>
+                  <a:stretch>
+                    <a:fillRect b="-2857"/>
+                  </a:stretch>
+                </a:blipFill>
+              </p:spPr>
+              <p:txBody>
+                <a:bodyPr/>
+                <a:lstStyle/>
+                <a:p>
+                  <a:r>
+                    <a:rPr lang="fr-FR">
+                      <a:noFill/>
+                    </a:rPr>
+                    <a:t> </a:t>
+                  </a:r>
+                </a:p>
+              </p:txBody>
+            </p:sp>
+          </mc:Fallback>
+        </mc:AlternateContent>
+      </p:grpSp>
+      <p:grpSp>
+        <p:nvGrpSpPr>
+          <p:cNvPr id="23" name="Groupe 22"/>
+          <p:cNvGrpSpPr/>
+          <p:nvPr/>
+        </p:nvGrpSpPr>
+        <p:grpSpPr>
+          <a:xfrm>
+            <a:off x="1868523" y="2464311"/>
+            <a:ext cx="1472496" cy="1458804"/>
+            <a:chOff x="478794" y="2461736"/>
+            <a:chExt cx="1472496" cy="1458804"/>
+          </a:xfrm>
+        </p:grpSpPr>
+        <p:grpSp>
+          <p:nvGrpSpPr>
+            <p:cNvPr id="24" name="Groupe 23"/>
+            <p:cNvGrpSpPr/>
+            <p:nvPr/>
+          </p:nvGrpSpPr>
+          <p:grpSpPr>
+            <a:xfrm>
+              <a:off x="545902" y="2461736"/>
+              <a:ext cx="1405388" cy="1289971"/>
+              <a:chOff x="2713784" y="2468086"/>
+              <a:chExt cx="1405388" cy="1289971"/>
+            </a:xfrm>
+          </p:grpSpPr>
+          <mc:AlternateContent xmlns:mc="http://schemas.openxmlformats.org/markup-compatibility/2006">
+            <mc:Choice xmlns:a14="http://schemas.microsoft.com/office/drawing/2010/main" Requires="a14">
+              <p:sp>
+                <p:nvSpPr>
+                  <p:cNvPr id="27" name="ZoneTexte 26"/>
+                  <p:cNvSpPr txBox="1"/>
+                  <p:nvPr/>
+                </p:nvSpPr>
+                <p:spPr>
+                  <a:xfrm>
+                    <a:off x="3779912" y="3302042"/>
+                    <a:ext cx="336118" cy="253916"/>
+                  </a:xfrm>
+                  <a:prstGeom prst="rect">
+                    <a:avLst/>
+                  </a:prstGeom>
+                  <a:noFill/>
+                </p:spPr>
+                <p:txBody>
+                  <a:bodyPr wrap="none" rtlCol="0">
+                    <a:spAutoFit/>
+                  </a:bodyPr>
+                  <a:lstStyle/>
+                  <a:p>
+                    <a:pPr/>
+                    <a14:m>
+                      <m:oMathPara xmlns:m="http://schemas.openxmlformats.org/officeDocument/2006/math">
+                        <m:oMathParaPr>
+                          <m:jc m:val="centerGroup"/>
+                        </m:oMathParaPr>
+                        <m:oMath xmlns:m="http://schemas.openxmlformats.org/officeDocument/2006/math">
+                          <m:acc>
+                            <m:accPr>
+                              <m:chr m:val="⃗"/>
+                              <m:ctrlPr>
+                                <a:rPr lang="fr-FR" sz="1050" b="0" i="1" smtClean="0">
+                                  <a:latin typeface="Cambria Math"/>
+                                </a:rPr>
+                              </m:ctrlPr>
+                            </m:accPr>
+                            <m:e>
+                              <m:sSub>
+                                <m:sSubPr>
+                                  <m:ctrlPr>
+                                    <a:rPr lang="fr-FR" sz="1050" i="1">
+                                      <a:latin typeface="Cambria Math"/>
+                                    </a:rPr>
+                                  </m:ctrlPr>
+                                </m:sSubPr>
+                                <m:e>
+                                  <m:r>
+                                    <a:rPr lang="fr-FR" sz="1050" b="0" i="1" smtClean="0">
+                                      <a:latin typeface="Cambria Math"/>
+                                    </a:rPr>
+                                    <m:t>𝑧</m:t>
+                                  </m:r>
+                                </m:e>
+                                <m:sub>
+                                  <m:r>
+                                    <a:rPr lang="fr-FR" sz="1050" b="0" i="1" smtClean="0">
+                                      <a:latin typeface="Cambria Math"/>
+                                    </a:rPr>
+                                    <m:t>1</m:t>
+                                  </m:r>
+                                </m:sub>
+                              </m:sSub>
+                            </m:e>
+                          </m:acc>
+                        </m:oMath>
+                      </m:oMathPara>
+                    </a14:m>
+                    <a:endParaRPr lang="fr-FR" sz="1050" dirty="0"/>
+                  </a:p>
+                </p:txBody>
+              </p:sp>
+            </mc:Choice>
+            <mc:Fallback>
+              <p:sp>
+                <p:nvSpPr>
+                  <p:cNvPr id="27" name="ZoneTexte 26"/>
+                  <p:cNvSpPr txBox="1">
+                    <a:spLocks noRot="1" noChangeAspect="1" noMove="1" noResize="1" noEditPoints="1" noAdjustHandles="1" noChangeArrowheads="1" noChangeShapeType="1" noTextEdit="1"/>
+                  </p:cNvSpPr>
+                  <p:nvPr/>
+                </p:nvSpPr>
+                <p:spPr>
+                  <a:xfrm>
+                    <a:off x="3779912" y="3302042"/>
+                    <a:ext cx="336118" cy="253916"/>
+                  </a:xfrm>
+                  <a:prstGeom prst="rect">
+                    <a:avLst/>
+                  </a:prstGeom>
+                  <a:blipFill rotWithShape="1">
+                    <a:blip r:embed="rId9"/>
+                    <a:stretch>
+                      <a:fillRect/>
+                    </a:stretch>
+                  </a:blipFill>
+                </p:spPr>
+                <p:txBody>
+                  <a:bodyPr/>
+                  <a:lstStyle/>
+                  <a:p>
+                    <a:r>
+                      <a:rPr lang="fr-FR">
+                        <a:noFill/>
+                      </a:rPr>
+                      <a:t> </a:t>
+                    </a:r>
+                  </a:p>
+                </p:txBody>
+              </p:sp>
+            </mc:Fallback>
+          </mc:AlternateContent>
+          <p:grpSp>
+            <p:nvGrpSpPr>
+              <p:cNvPr id="28" name="Groupe 27"/>
+              <p:cNvGrpSpPr/>
+              <p:nvPr/>
+            </p:nvGrpSpPr>
+            <p:grpSpPr>
+              <a:xfrm>
+                <a:off x="3131840" y="2722002"/>
+                <a:ext cx="706997" cy="706998"/>
+                <a:chOff x="3131840" y="2722002"/>
+                <a:chExt cx="706997" cy="706998"/>
+              </a:xfrm>
+            </p:grpSpPr>
+            <p:cxnSp>
+              <p:nvCxnSpPr>
+                <p:cNvPr id="38" name="Connecteur droit avec flèche 37"/>
+                <p:cNvCxnSpPr/>
+                <p:nvPr/>
+              </p:nvCxnSpPr>
+              <p:spPr>
+                <a:xfrm>
+                  <a:off x="3131840" y="3429000"/>
+                  <a:ext cx="706997" cy="0"/>
+                </a:xfrm>
+                <a:prstGeom prst="straightConnector1">
+                  <a:avLst/>
+                </a:prstGeom>
+                <a:ln w="12700">
+                  <a:solidFill>
+                    <a:srgbClr val="7030A0"/>
+                  </a:solidFill>
+                  <a:tailEnd type="stealth" w="med" len="lg"/>
+                </a:ln>
+              </p:spPr>
+              <p:style>
+                <a:lnRef idx="1">
+                  <a:schemeClr val="accent1"/>
+                </a:lnRef>
+                <a:fillRef idx="0">
+                  <a:schemeClr val="accent1"/>
+                </a:fillRef>
+                <a:effectRef idx="0">
+                  <a:schemeClr val="accent1"/>
+                </a:effectRef>
+                <a:fontRef idx="minor">
+                  <a:schemeClr val="tx1"/>
+                </a:fontRef>
+              </p:style>
+            </p:cxnSp>
+            <p:cxnSp>
+              <p:nvCxnSpPr>
+                <p:cNvPr id="39" name="Connecteur droit avec flèche 38"/>
+                <p:cNvCxnSpPr/>
+                <p:nvPr/>
+              </p:nvCxnSpPr>
+              <p:spPr>
+                <a:xfrm rot="16200000">
+                  <a:off x="2778342" y="3075501"/>
+                  <a:ext cx="706997" cy="0"/>
+                </a:xfrm>
+                <a:prstGeom prst="straightConnector1">
+                  <a:avLst/>
+                </a:prstGeom>
+                <a:ln w="12700">
+                  <a:solidFill>
+                    <a:srgbClr val="7030A0"/>
+                  </a:solidFill>
+                  <a:tailEnd type="stealth" w="med" len="lg"/>
+                </a:ln>
+              </p:spPr>
+              <p:style>
+                <a:lnRef idx="1">
+                  <a:schemeClr val="accent1"/>
+                </a:lnRef>
+                <a:fillRef idx="0">
+                  <a:schemeClr val="accent1"/>
+                </a:fillRef>
+                <a:effectRef idx="0">
+                  <a:schemeClr val="accent1"/>
+                </a:effectRef>
+                <a:fontRef idx="minor">
+                  <a:schemeClr val="tx1"/>
+                </a:fontRef>
+              </p:style>
+            </p:cxnSp>
+          </p:grpSp>
+          <mc:AlternateContent xmlns:mc="http://schemas.openxmlformats.org/markup-compatibility/2006">
+            <mc:Choice xmlns:a14="http://schemas.microsoft.com/office/drawing/2010/main" Requires="a14">
+              <p:sp>
+                <p:nvSpPr>
+                  <p:cNvPr id="29" name="ZoneTexte 28"/>
+                  <p:cNvSpPr txBox="1"/>
+                  <p:nvPr/>
+                </p:nvSpPr>
+                <p:spPr>
+                  <a:xfrm>
+                    <a:off x="2959613" y="2468086"/>
+                    <a:ext cx="344453" cy="253916"/>
+                  </a:xfrm>
+                  <a:prstGeom prst="rect">
+                    <a:avLst/>
+                  </a:prstGeom>
+                  <a:noFill/>
+                </p:spPr>
+                <p:txBody>
+                  <a:bodyPr wrap="none" rtlCol="0">
+                    <a:spAutoFit/>
+                  </a:bodyPr>
+                  <a:lstStyle/>
+                  <a:p>
+                    <a:pPr/>
+                    <a14:m>
+                      <m:oMathPara xmlns:m="http://schemas.openxmlformats.org/officeDocument/2006/math">
+                        <m:oMathParaPr>
+                          <m:jc m:val="centerGroup"/>
+                        </m:oMathParaPr>
+                        <m:oMath xmlns:m="http://schemas.openxmlformats.org/officeDocument/2006/math">
+                          <m:acc>
+                            <m:accPr>
+                              <m:chr m:val="⃗"/>
+                              <m:ctrlPr>
+                                <a:rPr lang="fr-FR" sz="1050" b="0" i="1" smtClean="0">
+                                  <a:latin typeface="Cambria Math"/>
+                                </a:rPr>
+                              </m:ctrlPr>
+                            </m:accPr>
+                            <m:e>
+                              <m:sSub>
+                                <m:sSubPr>
+                                  <m:ctrlPr>
+                                    <a:rPr lang="fr-FR" sz="1050" b="0" i="1" smtClean="0">
+                                      <a:latin typeface="Cambria Math"/>
+                                    </a:rPr>
+                                  </m:ctrlPr>
+                                </m:sSubPr>
+                                <m:e>
+                                  <m:r>
+                                    <a:rPr lang="fr-FR" sz="1050" i="1" smtClean="0">
+                                      <a:latin typeface="Cambria Math"/>
+                                    </a:rPr>
+                                    <m:t>𝑥</m:t>
+                                  </m:r>
+                                </m:e>
+                                <m:sub>
+                                  <m:r>
+                                    <a:rPr lang="fr-FR" sz="1050" b="0" i="1" smtClean="0">
+                                      <a:latin typeface="Cambria Math"/>
+                                    </a:rPr>
+                                    <m:t>1</m:t>
+                                  </m:r>
+                                </m:sub>
+                              </m:sSub>
+                            </m:e>
+                          </m:acc>
+                        </m:oMath>
+                      </m:oMathPara>
+                    </a14:m>
+                    <a:endParaRPr lang="fr-FR" sz="1050" dirty="0"/>
+                  </a:p>
+                </p:txBody>
+              </p:sp>
+            </mc:Choice>
+            <mc:Fallback>
+              <p:sp>
+                <p:nvSpPr>
+                  <p:cNvPr id="29" name="ZoneTexte 28"/>
+                  <p:cNvSpPr txBox="1">
+                    <a:spLocks noRot="1" noChangeAspect="1" noMove="1" noResize="1" noEditPoints="1" noAdjustHandles="1" noChangeArrowheads="1" noChangeShapeType="1" noTextEdit="1"/>
+                  </p:cNvSpPr>
+                  <p:nvPr/>
+                </p:nvSpPr>
+                <p:spPr>
+                  <a:xfrm>
+                    <a:off x="2959613" y="2468086"/>
+                    <a:ext cx="344453" cy="253916"/>
+                  </a:xfrm>
+                  <a:prstGeom prst="rect">
+                    <a:avLst/>
+                  </a:prstGeom>
+                  <a:blipFill rotWithShape="1">
+                    <a:blip r:embed="rId10"/>
+                    <a:stretch>
+                      <a:fillRect/>
+                    </a:stretch>
+                  </a:blipFill>
+                </p:spPr>
+                <p:txBody>
+                  <a:bodyPr/>
+                  <a:lstStyle/>
+                  <a:p>
+                    <a:r>
+                      <a:rPr lang="fr-FR">
+                        <a:noFill/>
+                      </a:rPr>
+                      <a:t> </a:t>
+                    </a:r>
+                  </a:p>
+                </p:txBody>
+              </p:sp>
+            </mc:Fallback>
+          </mc:AlternateContent>
+          <p:grpSp>
+            <p:nvGrpSpPr>
+              <p:cNvPr id="30" name="Groupe 29"/>
+              <p:cNvGrpSpPr/>
+              <p:nvPr/>
+            </p:nvGrpSpPr>
+            <p:grpSpPr>
+              <a:xfrm rot="20700000">
+                <a:off x="3034278" y="2642555"/>
+                <a:ext cx="706997" cy="706998"/>
+                <a:chOff x="3131840" y="2722002"/>
+                <a:chExt cx="706997" cy="706998"/>
+              </a:xfrm>
+            </p:grpSpPr>
+            <p:cxnSp>
+              <p:nvCxnSpPr>
+                <p:cNvPr id="36" name="Connecteur droit avec flèche 35"/>
+                <p:cNvCxnSpPr/>
+                <p:nvPr/>
+              </p:nvCxnSpPr>
+              <p:spPr>
+                <a:xfrm>
+                  <a:off x="3131840" y="3429000"/>
+                  <a:ext cx="706997" cy="0"/>
+                </a:xfrm>
+                <a:prstGeom prst="straightConnector1">
+                  <a:avLst/>
+                </a:prstGeom>
+                <a:ln w="12700">
+                  <a:solidFill>
+                    <a:srgbClr val="00B050"/>
+                  </a:solidFill>
+                  <a:tailEnd type="stealth" w="med" len="lg"/>
+                </a:ln>
+              </p:spPr>
+              <p:style>
+                <a:lnRef idx="1">
+                  <a:schemeClr val="accent1"/>
+                </a:lnRef>
+                <a:fillRef idx="0">
+                  <a:schemeClr val="accent1"/>
+                </a:fillRef>
+                <a:effectRef idx="0">
+                  <a:schemeClr val="accent1"/>
+                </a:effectRef>
+                <a:fontRef idx="minor">
+                  <a:schemeClr val="tx1"/>
+                </a:fontRef>
+              </p:style>
+            </p:cxnSp>
+            <p:cxnSp>
+              <p:nvCxnSpPr>
+                <p:cNvPr id="37" name="Connecteur droit avec flèche 36"/>
+                <p:cNvCxnSpPr/>
+                <p:nvPr/>
+              </p:nvCxnSpPr>
+              <p:spPr>
+                <a:xfrm rot="16200000">
+                  <a:off x="2778342" y="3075501"/>
+                  <a:ext cx="706997" cy="0"/>
+                </a:xfrm>
+                <a:prstGeom prst="straightConnector1">
+                  <a:avLst/>
+                </a:prstGeom>
+                <a:ln w="12700">
+                  <a:solidFill>
+                    <a:srgbClr val="00B050"/>
+                  </a:solidFill>
+                  <a:tailEnd type="stealth" w="med" len="lg"/>
+                </a:ln>
+              </p:spPr>
+              <p:style>
+                <a:lnRef idx="1">
+                  <a:schemeClr val="accent1"/>
+                </a:lnRef>
+                <a:fillRef idx="0">
+                  <a:schemeClr val="accent1"/>
+                </a:fillRef>
+                <a:effectRef idx="0">
+                  <a:schemeClr val="accent1"/>
+                </a:effectRef>
+                <a:fontRef idx="minor">
+                  <a:schemeClr val="tx1"/>
+                </a:fontRef>
+              </p:style>
+            </p:cxnSp>
+          </p:grpSp>
+          <mc:AlternateContent xmlns:mc="http://schemas.openxmlformats.org/markup-compatibility/2006">
+            <mc:Choice xmlns:a14="http://schemas.microsoft.com/office/drawing/2010/main" Requires="a14">
+              <p:sp>
+                <p:nvSpPr>
+                  <p:cNvPr id="31" name="ZoneTexte 30"/>
+                  <p:cNvSpPr txBox="1"/>
+                  <p:nvPr/>
+                </p:nvSpPr>
+                <p:spPr>
+                  <a:xfrm>
+                    <a:off x="3779912" y="3099143"/>
+                    <a:ext cx="339260" cy="253916"/>
+                  </a:xfrm>
+                  <a:prstGeom prst="rect">
+                    <a:avLst/>
+                  </a:prstGeom>
+                  <a:noFill/>
+                </p:spPr>
+                <p:txBody>
+                  <a:bodyPr wrap="none" rtlCol="0">
+                    <a:spAutoFit/>
+                  </a:bodyPr>
+                  <a:lstStyle/>
+                  <a:p>
+                    <a:pPr/>
+                    <a14:m>
+                      <m:oMathPara xmlns:m="http://schemas.openxmlformats.org/officeDocument/2006/math">
+                        <m:oMathParaPr>
+                          <m:jc m:val="centerGroup"/>
+                        </m:oMathParaPr>
+                        <m:oMath xmlns:m="http://schemas.openxmlformats.org/officeDocument/2006/math">
+                          <m:acc>
+                            <m:accPr>
+                              <m:chr m:val="⃗"/>
+                              <m:ctrlPr>
+                                <a:rPr lang="fr-FR" sz="1050" b="0" i="1" smtClean="0">
+                                  <a:latin typeface="Cambria Math"/>
+                                </a:rPr>
+                              </m:ctrlPr>
+                            </m:accPr>
+                            <m:e>
+                              <m:sSub>
+                                <m:sSubPr>
+                                  <m:ctrlPr>
+                                    <a:rPr lang="fr-FR" sz="1050" i="1">
+                                      <a:latin typeface="Cambria Math"/>
+                                    </a:rPr>
+                                  </m:ctrlPr>
+                                </m:sSubPr>
+                                <m:e>
+                                  <m:r>
+                                    <a:rPr lang="fr-FR" sz="1050" b="0" i="1" smtClean="0">
+                                      <a:latin typeface="Cambria Math"/>
+                                    </a:rPr>
+                                    <m:t>𝑧</m:t>
+                                  </m:r>
+                                </m:e>
+                                <m:sub>
+                                  <m:r>
+                                    <a:rPr lang="fr-FR" sz="1050" b="0" i="1" smtClean="0">
+                                      <a:latin typeface="Cambria Math"/>
+                                    </a:rPr>
+                                    <m:t>2</m:t>
+                                  </m:r>
+                                </m:sub>
+                              </m:sSub>
+                            </m:e>
+                          </m:acc>
+                        </m:oMath>
+                      </m:oMathPara>
+                    </a14:m>
+                    <a:endParaRPr lang="fr-FR" sz="1050" dirty="0"/>
+                  </a:p>
+                </p:txBody>
+              </p:sp>
+            </mc:Choice>
+            <mc:Fallback>
+              <p:sp>
+                <p:nvSpPr>
+                  <p:cNvPr id="31" name="ZoneTexte 30"/>
+                  <p:cNvSpPr txBox="1">
+                    <a:spLocks noRot="1" noChangeAspect="1" noMove="1" noResize="1" noEditPoints="1" noAdjustHandles="1" noChangeArrowheads="1" noChangeShapeType="1" noTextEdit="1"/>
+                  </p:cNvSpPr>
+                  <p:nvPr/>
+                </p:nvSpPr>
+                <p:spPr>
+                  <a:xfrm>
+                    <a:off x="3779912" y="3099143"/>
+                    <a:ext cx="339260" cy="253916"/>
+                  </a:xfrm>
+                  <a:prstGeom prst="rect">
+                    <a:avLst/>
+                  </a:prstGeom>
+                  <a:blipFill rotWithShape="1">
+                    <a:blip r:embed="rId11"/>
+                    <a:stretch>
+                      <a:fillRect/>
+                    </a:stretch>
+                  </a:blipFill>
+                </p:spPr>
+                <p:txBody>
+                  <a:bodyPr/>
+                  <a:lstStyle/>
+                  <a:p>
+                    <a:r>
+                      <a:rPr lang="fr-FR">
+                        <a:noFill/>
+                      </a:rPr>
+                      <a:t> </a:t>
+                    </a:r>
+                  </a:p>
+                </p:txBody>
+              </p:sp>
+            </mc:Fallback>
+          </mc:AlternateContent>
+          <mc:AlternateContent xmlns:mc="http://schemas.openxmlformats.org/markup-compatibility/2006">
+            <mc:Choice xmlns:a14="http://schemas.microsoft.com/office/drawing/2010/main" Requires="a14">
+              <p:sp>
+                <p:nvSpPr>
+                  <p:cNvPr id="32" name="ZoneTexte 31"/>
+                  <p:cNvSpPr txBox="1"/>
+                  <p:nvPr/>
+                </p:nvSpPr>
+                <p:spPr>
+                  <a:xfrm>
+                    <a:off x="2713784" y="2487180"/>
+                    <a:ext cx="347595" cy="253916"/>
+                  </a:xfrm>
+                  <a:prstGeom prst="rect">
+                    <a:avLst/>
+                  </a:prstGeom>
+                  <a:noFill/>
+                </p:spPr>
+                <p:txBody>
+                  <a:bodyPr wrap="none" rtlCol="0">
+                    <a:spAutoFit/>
+                  </a:bodyPr>
+                  <a:lstStyle/>
+                  <a:p>
+                    <a:pPr/>
+                    <a14:m>
+                      <m:oMathPara xmlns:m="http://schemas.openxmlformats.org/officeDocument/2006/math">
+                        <m:oMathParaPr>
+                          <m:jc m:val="centerGroup"/>
+                        </m:oMathParaPr>
+                        <m:oMath xmlns:m="http://schemas.openxmlformats.org/officeDocument/2006/math">
+                          <m:acc>
+                            <m:accPr>
+                              <m:chr m:val="⃗"/>
+                              <m:ctrlPr>
+                                <a:rPr lang="fr-FR" sz="1050" b="0" i="1" smtClean="0">
+                                  <a:latin typeface="Cambria Math"/>
+                                </a:rPr>
+                              </m:ctrlPr>
+                            </m:accPr>
+                            <m:e>
+                              <m:sSub>
+                                <m:sSubPr>
+                                  <m:ctrlPr>
+                                    <a:rPr lang="fr-FR" sz="1050" i="1">
+                                      <a:latin typeface="Cambria Math"/>
+                                    </a:rPr>
+                                  </m:ctrlPr>
+                                </m:sSubPr>
+                                <m:e>
+                                  <m:r>
+                                    <a:rPr lang="fr-FR" sz="1050" b="0" i="1" smtClean="0">
+                                      <a:latin typeface="Cambria Math"/>
+                                    </a:rPr>
+                                    <m:t>𝑥</m:t>
+                                  </m:r>
+                                </m:e>
+                                <m:sub>
+                                  <m:r>
+                                    <a:rPr lang="fr-FR" sz="1050" b="0" i="1" smtClean="0">
+                                      <a:latin typeface="Cambria Math"/>
+                                    </a:rPr>
+                                    <m:t>2</m:t>
+                                  </m:r>
+                                </m:sub>
+                              </m:sSub>
+                            </m:e>
+                          </m:acc>
+                        </m:oMath>
+                      </m:oMathPara>
+                    </a14:m>
+                    <a:endParaRPr lang="fr-FR" sz="1050" dirty="0"/>
+                  </a:p>
+                </p:txBody>
+              </p:sp>
+            </mc:Choice>
+            <mc:Fallback>
+              <p:sp>
+                <p:nvSpPr>
+                  <p:cNvPr id="32" name="ZoneTexte 31"/>
+                  <p:cNvSpPr txBox="1">
+                    <a:spLocks noRot="1" noChangeAspect="1" noMove="1" noResize="1" noEditPoints="1" noAdjustHandles="1" noChangeArrowheads="1" noChangeShapeType="1" noTextEdit="1"/>
+                  </p:cNvSpPr>
+                  <p:nvPr/>
+                </p:nvSpPr>
+                <p:spPr>
+                  <a:xfrm>
+                    <a:off x="2713784" y="2487180"/>
+                    <a:ext cx="347595" cy="253916"/>
+                  </a:xfrm>
+                  <a:prstGeom prst="rect">
+                    <a:avLst/>
+                  </a:prstGeom>
+                  <a:blipFill rotWithShape="1">
+                    <a:blip r:embed="rId12"/>
+                    <a:stretch>
+                      <a:fillRect/>
+                    </a:stretch>
+                  </a:blipFill>
+                </p:spPr>
+                <p:txBody>
+                  <a:bodyPr/>
+                  <a:lstStyle/>
+                  <a:p>
+                    <a:r>
+                      <a:rPr lang="fr-FR">
+                        <a:noFill/>
+                      </a:rPr>
+                      <a:t> </a:t>
+                    </a:r>
+                  </a:p>
+                </p:txBody>
+              </p:sp>
+            </mc:Fallback>
+          </mc:AlternateContent>
+          <p:sp>
+            <p:nvSpPr>
+              <p:cNvPr id="33" name="Ellipse 32"/>
+              <p:cNvSpPr/>
+              <p:nvPr/>
+            </p:nvSpPr>
+            <p:spPr>
+              <a:xfrm>
+                <a:off x="3061828" y="3356992"/>
+                <a:ext cx="144016" cy="144016"/>
+              </a:xfrm>
+              <a:prstGeom prst="ellipse">
+                <a:avLst/>
+              </a:prstGeom>
+              <a:solidFill>
+                <a:schemeClr val="bg1"/>
+              </a:solidFill>
+              <a:ln w="12700">
+                <a:solidFill>
+                  <a:srgbClr val="7030A0"/>
+                </a:solidFill>
+                <a:tailEnd type="stealth" w="med" len="lg"/>
+              </a:ln>
+            </p:spPr>
+            <p:style>
+              <a:lnRef idx="1">
+                <a:schemeClr val="accent1"/>
+              </a:lnRef>
+              <a:fillRef idx="0">
+                <a:schemeClr val="accent1"/>
+              </a:fillRef>
+              <a:effectRef idx="0">
+                <a:schemeClr val="accent1"/>
+              </a:effectRef>
+              <a:fontRef idx="minor">
+                <a:schemeClr val="tx1"/>
+              </a:fontRef>
+            </p:style>
+            <p:txBody>
+              <a:bodyPr rtlCol="0" anchor="ctr"/>
+              <a:lstStyle/>
+              <a:p>
+                <a:pPr algn="ctr"/>
+                <a:endParaRPr lang="fr-FR"/>
+              </a:p>
+            </p:txBody>
+          </p:sp>
+          <p:sp>
+            <p:nvSpPr>
+              <p:cNvPr id="34" name="Ellipse 33"/>
+              <p:cNvSpPr/>
+              <p:nvPr/>
+            </p:nvSpPr>
+            <p:spPr>
+              <a:xfrm>
+                <a:off x="3106398" y="3403558"/>
+                <a:ext cx="50884" cy="50884"/>
+              </a:xfrm>
+              <a:prstGeom prst="ellipse">
+                <a:avLst/>
+              </a:prstGeom>
+              <a:solidFill>
+                <a:srgbClr val="7030A0"/>
+              </a:solidFill>
+              <a:ln w="12700">
+                <a:solidFill>
+                  <a:srgbClr val="7030A0"/>
+                </a:solidFill>
+                <a:tailEnd type="stealth" w="med" len="lg"/>
+              </a:ln>
+            </p:spPr>
+            <p:style>
+              <a:lnRef idx="1">
+                <a:schemeClr val="accent1"/>
+              </a:lnRef>
+              <a:fillRef idx="0">
+                <a:schemeClr val="accent1"/>
+              </a:fillRef>
+              <a:effectRef idx="0">
+                <a:schemeClr val="accent1"/>
+              </a:effectRef>
+              <a:fontRef idx="minor">
+                <a:schemeClr val="tx1"/>
+              </a:fontRef>
+            </p:style>
+            <p:txBody>
+              <a:bodyPr rtlCol="0" anchor="ctr"/>
+              <a:lstStyle/>
+              <a:p>
+                <a:pPr algn="ctr"/>
+                <a:endParaRPr lang="fr-FR"/>
+              </a:p>
+            </p:txBody>
+          </p:sp>
+          <mc:AlternateContent xmlns:mc="http://schemas.openxmlformats.org/markup-compatibility/2006">
+            <mc:Choice xmlns:a14="http://schemas.microsoft.com/office/drawing/2010/main" Requires="a14">
+              <p:sp>
+                <p:nvSpPr>
+                  <p:cNvPr id="35" name="ZoneTexte 34"/>
+                  <p:cNvSpPr txBox="1"/>
+                  <p:nvPr/>
+                </p:nvSpPr>
+                <p:spPr>
+                  <a:xfrm>
+                    <a:off x="2782604" y="3504141"/>
+                    <a:ext cx="637268" cy="253916"/>
+                  </a:xfrm>
+                  <a:prstGeom prst="rect">
+                    <a:avLst/>
+                  </a:prstGeom>
+                  <a:noFill/>
+                </p:spPr>
+                <p:txBody>
+                  <a:bodyPr wrap="square" rtlCol="0">
+                    <a:spAutoFit/>
+                  </a:bodyPr>
+                  <a:lstStyle/>
+                  <a:p>
+                    <a14:m>
+                      <m:oMathPara xmlns:m="http://schemas.openxmlformats.org/officeDocument/2006/math">
+                        <m:oMathParaPr>
+                          <m:jc m:val="centerGroup"/>
+                        </m:oMathParaPr>
+                        <m:oMath xmlns:m="http://schemas.openxmlformats.org/officeDocument/2006/math">
+                          <m:acc>
+                            <m:accPr>
+                              <m:chr m:val="⃗"/>
+                              <m:ctrlPr>
+                                <a:rPr lang="fr-FR" sz="1050" i="1" smtClean="0">
+                                  <a:latin typeface="Cambria Math"/>
+                                </a:rPr>
+                              </m:ctrlPr>
+                            </m:accPr>
+                            <m:e>
+                              <m:sSub>
+                                <m:sSubPr>
+                                  <m:ctrlPr>
+                                    <a:rPr lang="fr-FR" sz="1050" b="0" i="1" smtClean="0">
+                                      <a:latin typeface="Cambria Math"/>
+                                    </a:rPr>
+                                  </m:ctrlPr>
+                                </m:sSubPr>
+                                <m:e>
+                                  <m:r>
+                                    <a:rPr lang="fr-FR" sz="1050" b="0" i="1" smtClean="0">
+                                      <a:latin typeface="Cambria Math"/>
+                                    </a:rPr>
+                                    <m:t>𝑦</m:t>
+                                  </m:r>
+                                </m:e>
+                                <m:sub>
+                                  <m:r>
+                                    <a:rPr lang="fr-FR" sz="1050" b="0" i="1" smtClean="0">
+                                      <a:latin typeface="Cambria Math"/>
+                                    </a:rPr>
+                                    <m:t>1</m:t>
+                                  </m:r>
+                                </m:sub>
+                              </m:sSub>
+                            </m:e>
+                          </m:acc>
+                          <m:r>
+                            <a:rPr lang="fr-FR" sz="1050" b="0" i="0" smtClean="0">
+                              <a:latin typeface="Cambria Math"/>
+                            </a:rPr>
+                            <m:t>=</m:t>
+                          </m:r>
+                          <m:acc>
+                            <m:accPr>
+                              <m:chr m:val="⃗"/>
+                              <m:ctrlPr>
+                                <a:rPr lang="fr-FR" sz="1050" b="0" i="1" smtClean="0">
+                                  <a:latin typeface="Cambria Math"/>
+                                </a:rPr>
+                              </m:ctrlPr>
+                            </m:accPr>
+                            <m:e>
+                              <m:sSub>
+                                <m:sSubPr>
+                                  <m:ctrlPr>
+                                    <a:rPr lang="fr-FR" sz="1050" b="0" i="1" smtClean="0">
+                                      <a:latin typeface="Cambria Math"/>
+                                    </a:rPr>
+                                  </m:ctrlPr>
+                                </m:sSubPr>
+                                <m:e>
+                                  <m:r>
+                                    <a:rPr lang="fr-FR" sz="1050" b="0" i="1" smtClean="0">
+                                      <a:latin typeface="Cambria Math"/>
+                                    </a:rPr>
+                                    <m:t>𝑦</m:t>
+                                  </m:r>
+                                </m:e>
+                                <m:sub>
+                                  <m:r>
+                                    <a:rPr lang="fr-FR" sz="1050" b="0" i="1" smtClean="0">
+                                      <a:latin typeface="Cambria Math"/>
+                                    </a:rPr>
+                                    <m:t>2</m:t>
+                                  </m:r>
+                                </m:sub>
+                              </m:sSub>
+                            </m:e>
+                          </m:acc>
+                        </m:oMath>
+                      </m:oMathPara>
+                    </a14:m>
+                    <a:endParaRPr lang="fr-FR" sz="1050" dirty="0"/>
+                  </a:p>
+                </p:txBody>
+              </p:sp>
+            </mc:Choice>
+            <mc:Fallback>
+              <p:sp>
+                <p:nvSpPr>
+                  <p:cNvPr id="35" name="ZoneTexte 34"/>
+                  <p:cNvSpPr txBox="1">
+                    <a:spLocks noRot="1" noChangeAspect="1" noMove="1" noResize="1" noEditPoints="1" noAdjustHandles="1" noChangeArrowheads="1" noChangeShapeType="1" noTextEdit="1"/>
+                  </p:cNvSpPr>
+                  <p:nvPr/>
+                </p:nvSpPr>
+                <p:spPr>
+                  <a:xfrm>
+                    <a:off x="2782604" y="3504141"/>
+                    <a:ext cx="637268" cy="253916"/>
+                  </a:xfrm>
+                  <a:prstGeom prst="rect">
+                    <a:avLst/>
+                  </a:prstGeom>
+                  <a:blipFill rotWithShape="1">
+                    <a:blip r:embed="rId13"/>
+                    <a:stretch>
+                      <a:fillRect/>
+                    </a:stretch>
+                  </a:blipFill>
+                </p:spPr>
+                <p:txBody>
+                  <a:bodyPr/>
+                  <a:lstStyle/>
+                  <a:p>
+                    <a:r>
+                      <a:rPr lang="fr-FR">
+                        <a:noFill/>
+                      </a:rPr>
+                      <a:t> </a:t>
+                    </a:r>
+                  </a:p>
+                </p:txBody>
+              </p:sp>
+            </mc:Fallback>
+          </mc:AlternateContent>
+        </p:grpSp>
+        <p:sp>
+          <p:nvSpPr>
+            <p:cNvPr id="25" name="Arc 24"/>
+            <p:cNvSpPr/>
+            <p:nvPr/>
+          </p:nvSpPr>
+          <p:spPr>
+            <a:xfrm>
+              <a:off x="478794" y="2940802"/>
+              <a:ext cx="979738" cy="979738"/>
+            </a:xfrm>
+            <a:prstGeom prst="arc">
+              <a:avLst>
+                <a:gd name="adj1" fmla="val 20515322"/>
+                <a:gd name="adj2" fmla="val 0"/>
+              </a:avLst>
+            </a:prstGeom>
+            <a:ln w="12700">
+              <a:solidFill>
+                <a:srgbClr val="00B050"/>
+              </a:solidFill>
+              <a:headEnd type="stealth" w="sm" len="med"/>
+              <a:tailEnd type="none" w="med" len="lg"/>
+            </a:ln>
+          </p:spPr>
+          <p:style>
+            <a:lnRef idx="1">
+              <a:schemeClr val="accent1"/>
+            </a:lnRef>
+            <a:fillRef idx="0">
+              <a:schemeClr val="accent1"/>
+            </a:fillRef>
+            <a:effectRef idx="0">
+              <a:schemeClr val="accent1"/>
+            </a:effectRef>
+            <a:fontRef idx="minor">
+              <a:schemeClr val="tx1"/>
+            </a:fontRef>
+          </p:style>
+          <p:txBody>
+            <a:bodyPr rtlCol="0" anchor="ctr"/>
+            <a:lstStyle/>
+            <a:p>
+              <a:pPr algn="ctr"/>
+              <a:endParaRPr lang="fr-FR">
+                <a:solidFill>
+                  <a:srgbClr val="7030A0"/>
+                </a:solidFill>
+              </a:endParaRPr>
+            </a:p>
+          </p:txBody>
+        </p:sp>
+        <mc:AlternateContent xmlns:mc="http://schemas.openxmlformats.org/markup-compatibility/2006">
+          <mc:Choice xmlns:a14="http://schemas.microsoft.com/office/drawing/2010/main" Requires="a14">
+            <p:sp>
+              <p:nvSpPr>
+                <p:cNvPr id="26" name="ZoneTexte 25"/>
+                <p:cNvSpPr txBox="1"/>
+                <p:nvPr/>
+              </p:nvSpPr>
+              <p:spPr>
+                <a:xfrm>
+                  <a:off x="1094039" y="3066385"/>
+                  <a:ext cx="503343" cy="215444"/>
+                </a:xfrm>
+                <a:prstGeom prst="rect">
+                  <a:avLst/>
+                </a:prstGeom>
+                <a:noFill/>
+              </p:spPr>
+              <p:txBody>
+                <a:bodyPr wrap="none" rtlCol="0">
+                  <a:spAutoFit/>
+                </a:bodyPr>
+                <a:lstStyle/>
+                <a:p>
+                  <a:pPr/>
+                  <a14:m>
+                    <m:oMathPara xmlns:m="http://schemas.openxmlformats.org/officeDocument/2006/math">
+                      <m:oMathParaPr>
+                        <m:jc m:val="centerGroup"/>
+                      </m:oMathParaPr>
+                      <m:oMath xmlns:m="http://schemas.openxmlformats.org/officeDocument/2006/math">
+                        <m:sSub>
+                          <m:sSubPr>
+                            <m:ctrlPr>
+                              <a:rPr lang="fr-FR" sz="800" b="0" i="1" smtClean="0">
+                                <a:latin typeface="Cambria Math"/>
+                              </a:rPr>
+                            </m:ctrlPr>
+                          </m:sSubPr>
+                          <m:e>
+                            <m:r>
+                              <a:rPr lang="fr-FR" sz="800" b="0" i="1" smtClean="0">
+                                <a:latin typeface="Cambria Math"/>
+                              </a:rPr>
+                              <m:t>𝜃</m:t>
+                            </m:r>
+                          </m:e>
+                          <m:sub>
+                            <m:r>
+                              <a:rPr lang="fr-FR" sz="800" b="0" i="1" smtClean="0">
+                                <a:latin typeface="Cambria Math"/>
+                              </a:rPr>
+                              <m:t>2</m:t>
+                            </m:r>
+                          </m:sub>
+                        </m:sSub>
+                        <m:r>
+                          <a:rPr lang="fr-FR" sz="800" b="0" i="1" smtClean="0">
+                            <a:latin typeface="Cambria Math"/>
+                          </a:rPr>
+                          <m:t>=</m:t>
+                        </m:r>
+                        <m:r>
+                          <a:rPr lang="fr-FR" sz="800" b="0" i="1" smtClean="0">
+                            <a:latin typeface="Cambria Math"/>
+                          </a:rPr>
+                          <m:t>𝜃</m:t>
+                        </m:r>
+                      </m:oMath>
+                    </m:oMathPara>
+                  </a14:m>
+                  <a:endParaRPr lang="fr-FR" sz="800" dirty="0"/>
+                </a:p>
+              </p:txBody>
+            </p:sp>
+          </mc:Choice>
+          <mc:Fallback>
+            <p:sp>
+              <p:nvSpPr>
+                <p:cNvPr id="26" name="ZoneTexte 25"/>
+                <p:cNvSpPr txBox="1">
+                  <a:spLocks noRot="1" noChangeAspect="1" noMove="1" noResize="1" noEditPoints="1" noAdjustHandles="1" noChangeArrowheads="1" noChangeShapeType="1" noTextEdit="1"/>
+                </p:cNvSpPr>
+                <p:nvPr/>
+              </p:nvSpPr>
+              <p:spPr>
+                <a:xfrm>
+                  <a:off x="1094039" y="3066385"/>
+                  <a:ext cx="503343" cy="215444"/>
+                </a:xfrm>
+                <a:prstGeom prst="rect">
+                  <a:avLst/>
+                </a:prstGeom>
+                <a:blipFill rotWithShape="1">
+                  <a:blip r:embed="rId14"/>
+                  <a:stretch>
+                    <a:fillRect/>
+                  </a:stretch>
+                </a:blipFill>
+              </p:spPr>
+              <p:txBody>
+                <a:bodyPr/>
+                <a:lstStyle/>
+                <a:p>
+                  <a:r>
+                    <a:rPr lang="fr-FR">
+                      <a:noFill/>
+                    </a:rPr>
+                    <a:t> </a:t>
+                  </a:r>
+                </a:p>
+              </p:txBody>
+            </p:sp>
+          </mc:Fallback>
+        </mc:AlternateContent>
+      </p:grpSp>
+      <p:grpSp>
+        <p:nvGrpSpPr>
+          <p:cNvPr id="40" name="Groupe 39"/>
+          <p:cNvGrpSpPr/>
+          <p:nvPr/>
+        </p:nvGrpSpPr>
+        <p:grpSpPr>
+          <a:xfrm>
+            <a:off x="3258252" y="2464311"/>
+            <a:ext cx="1472496" cy="1458804"/>
+            <a:chOff x="478794" y="2461736"/>
+            <a:chExt cx="1472496" cy="1458804"/>
+          </a:xfrm>
+        </p:grpSpPr>
+        <p:grpSp>
+          <p:nvGrpSpPr>
+            <p:cNvPr id="41" name="Groupe 40"/>
+            <p:cNvGrpSpPr/>
+            <p:nvPr/>
+          </p:nvGrpSpPr>
+          <p:grpSpPr>
+            <a:xfrm>
+              <a:off x="545902" y="2461736"/>
+              <a:ext cx="1405388" cy="1289971"/>
+              <a:chOff x="2713784" y="2468086"/>
+              <a:chExt cx="1405388" cy="1289971"/>
+            </a:xfrm>
+          </p:grpSpPr>
+          <mc:AlternateContent xmlns:mc="http://schemas.openxmlformats.org/markup-compatibility/2006">
+            <mc:Choice xmlns:a14="http://schemas.microsoft.com/office/drawing/2010/main" Requires="a14">
+              <p:sp>
+                <p:nvSpPr>
+                  <p:cNvPr id="44" name="ZoneTexte 43"/>
+                  <p:cNvSpPr txBox="1"/>
+                  <p:nvPr/>
+                </p:nvSpPr>
+                <p:spPr>
+                  <a:xfrm>
+                    <a:off x="3779912" y="3302042"/>
+                    <a:ext cx="336118" cy="253916"/>
+                  </a:xfrm>
+                  <a:prstGeom prst="rect">
+                    <a:avLst/>
+                  </a:prstGeom>
+                  <a:noFill/>
+                </p:spPr>
+                <p:txBody>
+                  <a:bodyPr wrap="none" rtlCol="0">
+                    <a:spAutoFit/>
+                  </a:bodyPr>
+                  <a:lstStyle/>
+                  <a:p>
+                    <a:pPr/>
+                    <a14:m>
+                      <m:oMathPara xmlns:m="http://schemas.openxmlformats.org/officeDocument/2006/math">
+                        <m:oMathParaPr>
+                          <m:jc m:val="centerGroup"/>
+                        </m:oMathParaPr>
+                        <m:oMath xmlns:m="http://schemas.openxmlformats.org/officeDocument/2006/math">
+                          <m:acc>
+                            <m:accPr>
+                              <m:chr m:val="⃗"/>
+                              <m:ctrlPr>
+                                <a:rPr lang="fr-FR" sz="1050" b="0" i="1" smtClean="0">
+                                  <a:latin typeface="Cambria Math"/>
+                                </a:rPr>
+                              </m:ctrlPr>
+                            </m:accPr>
+                            <m:e>
+                              <m:sSub>
+                                <m:sSubPr>
+                                  <m:ctrlPr>
+                                    <a:rPr lang="fr-FR" sz="1050" i="1">
+                                      <a:latin typeface="Cambria Math"/>
+                                    </a:rPr>
+                                  </m:ctrlPr>
+                                </m:sSubPr>
+                                <m:e>
+                                  <m:r>
+                                    <a:rPr lang="fr-FR" sz="1050" b="0" i="1" smtClean="0">
+                                      <a:latin typeface="Cambria Math"/>
+                                    </a:rPr>
+                                    <m:t>𝑧</m:t>
+                                  </m:r>
+                                </m:e>
+                                <m:sub>
+                                  <m:r>
+                                    <a:rPr lang="fr-FR" sz="1050" b="0" i="1" smtClean="0">
+                                      <a:latin typeface="Cambria Math"/>
+                                    </a:rPr>
+                                    <m:t>1</m:t>
+                                  </m:r>
+                                </m:sub>
+                              </m:sSub>
+                            </m:e>
+                          </m:acc>
+                        </m:oMath>
+                      </m:oMathPara>
+                    </a14:m>
+                    <a:endParaRPr lang="fr-FR" sz="1050" dirty="0"/>
+                  </a:p>
+                </p:txBody>
+              </p:sp>
+            </mc:Choice>
+            <mc:Fallback>
+              <p:sp>
+                <p:nvSpPr>
+                  <p:cNvPr id="44" name="ZoneTexte 43"/>
+                  <p:cNvSpPr txBox="1">
+                    <a:spLocks noRot="1" noChangeAspect="1" noMove="1" noResize="1" noEditPoints="1" noAdjustHandles="1" noChangeArrowheads="1" noChangeShapeType="1" noTextEdit="1"/>
+                  </p:cNvSpPr>
+                  <p:nvPr/>
+                </p:nvSpPr>
+                <p:spPr>
+                  <a:xfrm>
+                    <a:off x="3779912" y="3302042"/>
+                    <a:ext cx="336118" cy="253916"/>
+                  </a:xfrm>
+                  <a:prstGeom prst="rect">
+                    <a:avLst/>
+                  </a:prstGeom>
+                  <a:blipFill rotWithShape="1">
+                    <a:blip r:embed="rId15"/>
+                    <a:stretch>
+                      <a:fillRect/>
+                    </a:stretch>
+                  </a:blipFill>
+                </p:spPr>
+                <p:txBody>
+                  <a:bodyPr/>
+                  <a:lstStyle/>
+                  <a:p>
+                    <a:r>
+                      <a:rPr lang="fr-FR">
+                        <a:noFill/>
+                      </a:rPr>
+                      <a:t> </a:t>
+                    </a:r>
+                  </a:p>
+                </p:txBody>
+              </p:sp>
+            </mc:Fallback>
+          </mc:AlternateContent>
+          <p:grpSp>
+            <p:nvGrpSpPr>
+              <p:cNvPr id="45" name="Groupe 44"/>
+              <p:cNvGrpSpPr/>
+              <p:nvPr/>
+            </p:nvGrpSpPr>
+            <p:grpSpPr>
+              <a:xfrm>
+                <a:off x="3131840" y="2722002"/>
+                <a:ext cx="706997" cy="706998"/>
+                <a:chOff x="3131840" y="2722002"/>
+                <a:chExt cx="706997" cy="706998"/>
+              </a:xfrm>
+            </p:grpSpPr>
+            <p:cxnSp>
+              <p:nvCxnSpPr>
+                <p:cNvPr id="55" name="Connecteur droit avec flèche 54"/>
+                <p:cNvCxnSpPr/>
+                <p:nvPr/>
+              </p:nvCxnSpPr>
+              <p:spPr>
+                <a:xfrm>
+                  <a:off x="3131840" y="3429000"/>
+                  <a:ext cx="706997" cy="0"/>
+                </a:xfrm>
+                <a:prstGeom prst="straightConnector1">
+                  <a:avLst/>
+                </a:prstGeom>
+                <a:ln w="12700">
+                  <a:solidFill>
+                    <a:srgbClr val="7030A0"/>
+                  </a:solidFill>
+                  <a:tailEnd type="stealth" w="med" len="lg"/>
+                </a:ln>
+              </p:spPr>
+              <p:style>
+                <a:lnRef idx="1">
+                  <a:schemeClr val="accent1"/>
+                </a:lnRef>
+                <a:fillRef idx="0">
+                  <a:schemeClr val="accent1"/>
+                </a:fillRef>
+                <a:effectRef idx="0">
+                  <a:schemeClr val="accent1"/>
+                </a:effectRef>
+                <a:fontRef idx="minor">
+                  <a:schemeClr val="tx1"/>
+                </a:fontRef>
+              </p:style>
+            </p:cxnSp>
+            <p:cxnSp>
+              <p:nvCxnSpPr>
+                <p:cNvPr id="56" name="Connecteur droit avec flèche 55"/>
+                <p:cNvCxnSpPr/>
+                <p:nvPr/>
+              </p:nvCxnSpPr>
+              <p:spPr>
+                <a:xfrm rot="16200000">
+                  <a:off x="2778342" y="3075501"/>
+                  <a:ext cx="706997" cy="0"/>
+                </a:xfrm>
+                <a:prstGeom prst="straightConnector1">
+                  <a:avLst/>
+                </a:prstGeom>
+                <a:ln w="12700">
+                  <a:solidFill>
+                    <a:srgbClr val="7030A0"/>
+                  </a:solidFill>
+                  <a:tailEnd type="stealth" w="med" len="lg"/>
+                </a:ln>
+              </p:spPr>
+              <p:style>
+                <a:lnRef idx="1">
+                  <a:schemeClr val="accent1"/>
+                </a:lnRef>
+                <a:fillRef idx="0">
+                  <a:schemeClr val="accent1"/>
+                </a:fillRef>
+                <a:effectRef idx="0">
+                  <a:schemeClr val="accent1"/>
+                </a:effectRef>
+                <a:fontRef idx="minor">
+                  <a:schemeClr val="tx1"/>
+                </a:fontRef>
+              </p:style>
+            </p:cxnSp>
+          </p:grpSp>
+          <mc:AlternateContent xmlns:mc="http://schemas.openxmlformats.org/markup-compatibility/2006">
+            <mc:Choice xmlns:a14="http://schemas.microsoft.com/office/drawing/2010/main" Requires="a14">
+              <p:sp>
+                <p:nvSpPr>
+                  <p:cNvPr id="46" name="ZoneTexte 45"/>
+                  <p:cNvSpPr txBox="1"/>
+                  <p:nvPr/>
+                </p:nvSpPr>
+                <p:spPr>
+                  <a:xfrm>
+                    <a:off x="2959613" y="2468086"/>
+                    <a:ext cx="344453" cy="253916"/>
+                  </a:xfrm>
+                  <a:prstGeom prst="rect">
+                    <a:avLst/>
+                  </a:prstGeom>
+                  <a:noFill/>
+                </p:spPr>
+                <p:txBody>
+                  <a:bodyPr wrap="none" rtlCol="0">
+                    <a:spAutoFit/>
+                  </a:bodyPr>
+                  <a:lstStyle/>
+                  <a:p>
+                    <a:pPr/>
+                    <a14:m>
+                      <m:oMathPara xmlns:m="http://schemas.openxmlformats.org/officeDocument/2006/math">
+                        <m:oMathParaPr>
+                          <m:jc m:val="centerGroup"/>
+                        </m:oMathParaPr>
+                        <m:oMath xmlns:m="http://schemas.openxmlformats.org/officeDocument/2006/math">
+                          <m:acc>
+                            <m:accPr>
+                              <m:chr m:val="⃗"/>
+                              <m:ctrlPr>
+                                <a:rPr lang="fr-FR" sz="1050" b="0" i="1" smtClean="0">
+                                  <a:latin typeface="Cambria Math"/>
+                                </a:rPr>
+                              </m:ctrlPr>
+                            </m:accPr>
+                            <m:e>
+                              <m:sSub>
+                                <m:sSubPr>
+                                  <m:ctrlPr>
+                                    <a:rPr lang="fr-FR" sz="1050" b="0" i="1" smtClean="0">
+                                      <a:latin typeface="Cambria Math"/>
+                                    </a:rPr>
+                                  </m:ctrlPr>
+                                </m:sSubPr>
+                                <m:e>
+                                  <m:r>
+                                    <a:rPr lang="fr-FR" sz="1050" i="1" smtClean="0">
+                                      <a:latin typeface="Cambria Math"/>
+                                    </a:rPr>
+                                    <m:t>𝑥</m:t>
+                                  </m:r>
+                                </m:e>
+                                <m:sub>
+                                  <m:r>
+                                    <a:rPr lang="fr-FR" sz="1050" b="0" i="1" smtClean="0">
+                                      <a:latin typeface="Cambria Math"/>
+                                    </a:rPr>
+                                    <m:t>1</m:t>
+                                  </m:r>
+                                </m:sub>
+                              </m:sSub>
+                            </m:e>
+                          </m:acc>
+                        </m:oMath>
+                      </m:oMathPara>
+                    </a14:m>
+                    <a:endParaRPr lang="fr-FR" sz="1050" dirty="0"/>
+                  </a:p>
+                </p:txBody>
+              </p:sp>
+            </mc:Choice>
+            <mc:Fallback>
+              <p:sp>
+                <p:nvSpPr>
+                  <p:cNvPr id="46" name="ZoneTexte 45"/>
+                  <p:cNvSpPr txBox="1">
+                    <a:spLocks noRot="1" noChangeAspect="1" noMove="1" noResize="1" noEditPoints="1" noAdjustHandles="1" noChangeArrowheads="1" noChangeShapeType="1" noTextEdit="1"/>
+                  </p:cNvSpPr>
+                  <p:nvPr/>
+                </p:nvSpPr>
+                <p:spPr>
+                  <a:xfrm>
+                    <a:off x="2959613" y="2468086"/>
+                    <a:ext cx="344453" cy="253916"/>
+                  </a:xfrm>
+                  <a:prstGeom prst="rect">
+                    <a:avLst/>
+                  </a:prstGeom>
+                  <a:blipFill rotWithShape="1">
+                    <a:blip r:embed="rId16"/>
+                    <a:stretch>
+                      <a:fillRect/>
+                    </a:stretch>
+                  </a:blipFill>
+                </p:spPr>
+                <p:txBody>
+                  <a:bodyPr/>
+                  <a:lstStyle/>
+                  <a:p>
+                    <a:r>
+                      <a:rPr lang="fr-FR">
+                        <a:noFill/>
+                      </a:rPr>
+                      <a:t> </a:t>
+                    </a:r>
+                  </a:p>
+                </p:txBody>
+              </p:sp>
+            </mc:Fallback>
+          </mc:AlternateContent>
+          <p:grpSp>
+            <p:nvGrpSpPr>
+              <p:cNvPr id="47" name="Groupe 46"/>
+              <p:cNvGrpSpPr/>
+              <p:nvPr/>
+            </p:nvGrpSpPr>
+            <p:grpSpPr>
+              <a:xfrm rot="20700000">
+                <a:off x="3034278" y="2642555"/>
+                <a:ext cx="706997" cy="706998"/>
+                <a:chOff x="3131840" y="2722002"/>
+                <a:chExt cx="706997" cy="706998"/>
+              </a:xfrm>
+            </p:grpSpPr>
+            <p:cxnSp>
+              <p:nvCxnSpPr>
+                <p:cNvPr id="53" name="Connecteur droit avec flèche 52"/>
+                <p:cNvCxnSpPr/>
+                <p:nvPr/>
+              </p:nvCxnSpPr>
+              <p:spPr>
+                <a:xfrm>
+                  <a:off x="3131840" y="3429000"/>
+                  <a:ext cx="706997" cy="0"/>
+                </a:xfrm>
+                <a:prstGeom prst="straightConnector1">
+                  <a:avLst/>
+                </a:prstGeom>
+                <a:ln w="12700">
+                  <a:solidFill>
+                    <a:srgbClr val="FF0000"/>
+                  </a:solidFill>
+                  <a:tailEnd type="stealth" w="med" len="lg"/>
+                </a:ln>
+              </p:spPr>
+              <p:style>
+                <a:lnRef idx="1">
+                  <a:schemeClr val="accent1"/>
+                </a:lnRef>
+                <a:fillRef idx="0">
+                  <a:schemeClr val="accent1"/>
+                </a:fillRef>
+                <a:effectRef idx="0">
+                  <a:schemeClr val="accent1"/>
+                </a:effectRef>
+                <a:fontRef idx="minor">
+                  <a:schemeClr val="tx1"/>
+                </a:fontRef>
+              </p:style>
+            </p:cxnSp>
+            <p:cxnSp>
+              <p:nvCxnSpPr>
+                <p:cNvPr id="54" name="Connecteur droit avec flèche 53"/>
+                <p:cNvCxnSpPr/>
+                <p:nvPr/>
+              </p:nvCxnSpPr>
+              <p:spPr>
+                <a:xfrm rot="16200000">
+                  <a:off x="2778342" y="3075501"/>
+                  <a:ext cx="706997" cy="0"/>
+                </a:xfrm>
+                <a:prstGeom prst="straightConnector1">
+                  <a:avLst/>
+                </a:prstGeom>
+                <a:ln w="12700">
+                  <a:solidFill>
+                    <a:srgbClr val="FF0000"/>
+                  </a:solidFill>
+                  <a:tailEnd type="stealth" w="med" len="lg"/>
+                </a:ln>
+              </p:spPr>
+              <p:style>
+                <a:lnRef idx="1">
+                  <a:schemeClr val="accent1"/>
+                </a:lnRef>
+                <a:fillRef idx="0">
+                  <a:schemeClr val="accent1"/>
+                </a:fillRef>
+                <a:effectRef idx="0">
+                  <a:schemeClr val="accent1"/>
+                </a:effectRef>
+                <a:fontRef idx="minor">
+                  <a:schemeClr val="tx1"/>
+                </a:fontRef>
+              </p:style>
+            </p:cxnSp>
+          </p:grpSp>
+          <mc:AlternateContent xmlns:mc="http://schemas.openxmlformats.org/markup-compatibility/2006">
+            <mc:Choice xmlns:a14="http://schemas.microsoft.com/office/drawing/2010/main" Requires="a14">
+              <p:sp>
+                <p:nvSpPr>
+                  <p:cNvPr id="48" name="ZoneTexte 47"/>
+                  <p:cNvSpPr txBox="1"/>
+                  <p:nvPr/>
+                </p:nvSpPr>
+                <p:spPr>
+                  <a:xfrm>
+                    <a:off x="3779912" y="3099143"/>
+                    <a:ext cx="339260" cy="253916"/>
+                  </a:xfrm>
+                  <a:prstGeom prst="rect">
+                    <a:avLst/>
+                  </a:prstGeom>
+                  <a:noFill/>
+                </p:spPr>
+                <p:txBody>
+                  <a:bodyPr wrap="none" rtlCol="0">
+                    <a:spAutoFit/>
+                  </a:bodyPr>
+                  <a:lstStyle/>
+                  <a:p>
+                    <a:pPr/>
+                    <a14:m>
+                      <m:oMathPara xmlns:m="http://schemas.openxmlformats.org/officeDocument/2006/math">
+                        <m:oMathParaPr>
+                          <m:jc m:val="centerGroup"/>
+                        </m:oMathParaPr>
+                        <m:oMath xmlns:m="http://schemas.openxmlformats.org/officeDocument/2006/math">
+                          <m:acc>
+                            <m:accPr>
+                              <m:chr m:val="⃗"/>
+                              <m:ctrlPr>
+                                <a:rPr lang="fr-FR" sz="1050" b="0" i="1" smtClean="0">
+                                  <a:latin typeface="Cambria Math"/>
+                                </a:rPr>
+                              </m:ctrlPr>
+                            </m:accPr>
+                            <m:e>
+                              <m:sSub>
+                                <m:sSubPr>
+                                  <m:ctrlPr>
+                                    <a:rPr lang="fr-FR" sz="1050" b="0" i="1" smtClean="0">
+                                      <a:latin typeface="Cambria Math"/>
+                                    </a:rPr>
+                                  </m:ctrlPr>
+                                </m:sSubPr>
+                                <m:e>
+                                  <m:r>
+                                    <a:rPr lang="fr-FR" sz="1050" b="0" i="1" smtClean="0">
+                                      <a:latin typeface="Cambria Math"/>
+                                    </a:rPr>
+                                    <m:t>𝑧</m:t>
+                                  </m:r>
+                                </m:e>
+                                <m:sub>
+                                  <m:r>
+                                    <a:rPr lang="fr-FR" sz="1050" b="0" i="1" smtClean="0">
+                                      <a:latin typeface="Cambria Math"/>
+                                    </a:rPr>
+                                    <m:t>3</m:t>
+                                  </m:r>
+                                </m:sub>
+                              </m:sSub>
+                            </m:e>
+                          </m:acc>
+                        </m:oMath>
+                      </m:oMathPara>
+                    </a14:m>
+                    <a:endParaRPr lang="fr-FR" sz="1050" dirty="0"/>
+                  </a:p>
+                </p:txBody>
+              </p:sp>
+            </mc:Choice>
+            <mc:Fallback>
+              <p:sp>
+                <p:nvSpPr>
+                  <p:cNvPr id="48" name="ZoneTexte 47"/>
+                  <p:cNvSpPr txBox="1">
+                    <a:spLocks noRot="1" noChangeAspect="1" noMove="1" noResize="1" noEditPoints="1" noAdjustHandles="1" noChangeArrowheads="1" noChangeShapeType="1" noTextEdit="1"/>
+                  </p:cNvSpPr>
+                  <p:nvPr/>
+                </p:nvSpPr>
+                <p:spPr>
+                  <a:xfrm>
+                    <a:off x="3779912" y="3099143"/>
+                    <a:ext cx="339260" cy="253916"/>
+                  </a:xfrm>
+                  <a:prstGeom prst="rect">
+                    <a:avLst/>
+                  </a:prstGeom>
+                  <a:blipFill rotWithShape="1">
+                    <a:blip r:embed="rId17"/>
+                    <a:stretch>
+                      <a:fillRect/>
+                    </a:stretch>
+                  </a:blipFill>
+                </p:spPr>
+                <p:txBody>
+                  <a:bodyPr/>
+                  <a:lstStyle/>
+                  <a:p>
+                    <a:r>
+                      <a:rPr lang="fr-FR">
+                        <a:noFill/>
+                      </a:rPr>
+                      <a:t> </a:t>
+                    </a:r>
+                  </a:p>
+                </p:txBody>
+              </p:sp>
+            </mc:Fallback>
+          </mc:AlternateContent>
+          <mc:AlternateContent xmlns:mc="http://schemas.openxmlformats.org/markup-compatibility/2006">
+            <mc:Choice xmlns:a14="http://schemas.microsoft.com/office/drawing/2010/main" Requires="a14">
+              <p:sp>
+                <p:nvSpPr>
+                  <p:cNvPr id="49" name="ZoneTexte 48"/>
+                  <p:cNvSpPr txBox="1"/>
+                  <p:nvPr/>
+                </p:nvSpPr>
+                <p:spPr>
+                  <a:xfrm>
+                    <a:off x="2713784" y="2487180"/>
+                    <a:ext cx="347596" cy="253916"/>
+                  </a:xfrm>
+                  <a:prstGeom prst="rect">
+                    <a:avLst/>
+                  </a:prstGeom>
+                  <a:noFill/>
+                </p:spPr>
+                <p:txBody>
+                  <a:bodyPr wrap="none" rtlCol="0">
+                    <a:spAutoFit/>
+                  </a:bodyPr>
+                  <a:lstStyle/>
+                  <a:p>
+                    <a:pPr/>
+                    <a14:m>
+                      <m:oMathPara xmlns:m="http://schemas.openxmlformats.org/officeDocument/2006/math">
+                        <m:oMathParaPr>
+                          <m:jc m:val="centerGroup"/>
+                        </m:oMathParaPr>
+                        <m:oMath xmlns:m="http://schemas.openxmlformats.org/officeDocument/2006/math">
+                          <m:acc>
+                            <m:accPr>
+                              <m:chr m:val="⃗"/>
+                              <m:ctrlPr>
+                                <a:rPr lang="fr-FR" sz="1050" b="0" i="1" smtClean="0">
+                                  <a:latin typeface="Cambria Math"/>
+                                </a:rPr>
+                              </m:ctrlPr>
+                            </m:accPr>
+                            <m:e>
+                              <m:sSub>
+                                <m:sSubPr>
+                                  <m:ctrlPr>
+                                    <a:rPr lang="fr-FR" sz="1050" b="0" i="1" smtClean="0">
+                                      <a:latin typeface="Cambria Math"/>
+                                    </a:rPr>
+                                  </m:ctrlPr>
+                                </m:sSubPr>
+                                <m:e>
+                                  <m:r>
+                                    <a:rPr lang="fr-FR" sz="1050" i="1" smtClean="0">
+                                      <a:latin typeface="Cambria Math"/>
+                                    </a:rPr>
+                                    <m:t>𝑥</m:t>
+                                  </m:r>
+                                </m:e>
+                                <m:sub>
+                                  <m:r>
+                                    <a:rPr lang="fr-FR" sz="1050" b="0" i="1" smtClean="0">
+                                      <a:latin typeface="Cambria Math"/>
+                                    </a:rPr>
+                                    <m:t>3</m:t>
+                                  </m:r>
+                                </m:sub>
+                              </m:sSub>
+                            </m:e>
+                          </m:acc>
+                        </m:oMath>
+                      </m:oMathPara>
+                    </a14:m>
+                    <a:endParaRPr lang="fr-FR" sz="1050" dirty="0"/>
+                  </a:p>
+                </p:txBody>
+              </p:sp>
+            </mc:Choice>
+            <mc:Fallback>
+              <p:sp>
+                <p:nvSpPr>
+                  <p:cNvPr id="49" name="ZoneTexte 48"/>
+                  <p:cNvSpPr txBox="1">
+                    <a:spLocks noRot="1" noChangeAspect="1" noMove="1" noResize="1" noEditPoints="1" noAdjustHandles="1" noChangeArrowheads="1" noChangeShapeType="1" noTextEdit="1"/>
+                  </p:cNvSpPr>
+                  <p:nvPr/>
+                </p:nvSpPr>
+                <p:spPr>
+                  <a:xfrm>
+                    <a:off x="2713784" y="2487180"/>
+                    <a:ext cx="347596" cy="253916"/>
+                  </a:xfrm>
+                  <a:prstGeom prst="rect">
+                    <a:avLst/>
+                  </a:prstGeom>
+                  <a:blipFill rotWithShape="1">
+                    <a:blip r:embed="rId18"/>
+                    <a:stretch>
+                      <a:fillRect/>
+                    </a:stretch>
+                  </a:blipFill>
+                </p:spPr>
+                <p:txBody>
+                  <a:bodyPr/>
+                  <a:lstStyle/>
+                  <a:p>
+                    <a:r>
+                      <a:rPr lang="fr-FR">
+                        <a:noFill/>
+                      </a:rPr>
+                      <a:t> </a:t>
+                    </a:r>
+                  </a:p>
+                </p:txBody>
+              </p:sp>
+            </mc:Fallback>
+          </mc:AlternateContent>
+          <p:sp>
+            <p:nvSpPr>
+              <p:cNvPr id="50" name="Ellipse 49"/>
+              <p:cNvSpPr/>
+              <p:nvPr/>
+            </p:nvSpPr>
+            <p:spPr>
+              <a:xfrm>
+                <a:off x="3061828" y="3356992"/>
+                <a:ext cx="144016" cy="144016"/>
+              </a:xfrm>
+              <a:prstGeom prst="ellipse">
+                <a:avLst/>
+              </a:prstGeom>
+              <a:solidFill>
+                <a:schemeClr val="bg1"/>
+              </a:solidFill>
+              <a:ln w="12700">
+                <a:solidFill>
+                  <a:srgbClr val="7030A0"/>
+                </a:solidFill>
+                <a:tailEnd type="stealth" w="med" len="lg"/>
+              </a:ln>
+            </p:spPr>
+            <p:style>
+              <a:lnRef idx="1">
+                <a:schemeClr val="accent1"/>
+              </a:lnRef>
+              <a:fillRef idx="0">
+                <a:schemeClr val="accent1"/>
+              </a:fillRef>
+              <a:effectRef idx="0">
+                <a:schemeClr val="accent1"/>
+              </a:effectRef>
+              <a:fontRef idx="minor">
+                <a:schemeClr val="tx1"/>
+              </a:fontRef>
+            </p:style>
+            <p:txBody>
+              <a:bodyPr rtlCol="0" anchor="ctr"/>
+              <a:lstStyle/>
+              <a:p>
+                <a:pPr algn="ctr"/>
+                <a:endParaRPr lang="fr-FR"/>
+              </a:p>
+            </p:txBody>
+          </p:sp>
+          <p:sp>
+            <p:nvSpPr>
+              <p:cNvPr id="51" name="Ellipse 50"/>
+              <p:cNvSpPr/>
+              <p:nvPr/>
+            </p:nvSpPr>
+            <p:spPr>
+              <a:xfrm>
+                <a:off x="3106398" y="3403558"/>
+                <a:ext cx="50884" cy="50884"/>
+              </a:xfrm>
+              <a:prstGeom prst="ellipse">
+                <a:avLst/>
+              </a:prstGeom>
+              <a:solidFill>
+                <a:srgbClr val="7030A0"/>
+              </a:solidFill>
+              <a:ln w="12700">
+                <a:solidFill>
+                  <a:srgbClr val="7030A0"/>
+                </a:solidFill>
+                <a:tailEnd type="stealth" w="med" len="lg"/>
+              </a:ln>
+            </p:spPr>
+            <p:style>
+              <a:lnRef idx="1">
+                <a:schemeClr val="accent1"/>
+              </a:lnRef>
+              <a:fillRef idx="0">
+                <a:schemeClr val="accent1"/>
+              </a:fillRef>
+              <a:effectRef idx="0">
+                <a:schemeClr val="accent1"/>
+              </a:effectRef>
+              <a:fontRef idx="minor">
+                <a:schemeClr val="tx1"/>
+              </a:fontRef>
+            </p:style>
+            <p:txBody>
+              <a:bodyPr rtlCol="0" anchor="ctr"/>
+              <a:lstStyle/>
+              <a:p>
+                <a:pPr algn="ctr"/>
+                <a:endParaRPr lang="fr-FR"/>
+              </a:p>
+            </p:txBody>
+          </p:sp>
+          <mc:AlternateContent xmlns:mc="http://schemas.openxmlformats.org/markup-compatibility/2006">
+            <mc:Choice xmlns:a14="http://schemas.microsoft.com/office/drawing/2010/main" Requires="a14">
+              <p:sp>
+                <p:nvSpPr>
+                  <p:cNvPr id="52" name="ZoneTexte 51"/>
+                  <p:cNvSpPr txBox="1"/>
+                  <p:nvPr/>
+                </p:nvSpPr>
+                <p:spPr>
+                  <a:xfrm>
+                    <a:off x="2782604" y="3504141"/>
+                    <a:ext cx="637268" cy="253916"/>
+                  </a:xfrm>
+                  <a:prstGeom prst="rect">
+                    <a:avLst/>
+                  </a:prstGeom>
+                  <a:noFill/>
+                </p:spPr>
+                <p:txBody>
+                  <a:bodyPr wrap="square" rtlCol="0">
+                    <a:spAutoFit/>
+                  </a:bodyPr>
+                  <a:lstStyle/>
+                  <a:p>
+                    <a14:m>
+                      <m:oMathPara xmlns:m="http://schemas.openxmlformats.org/officeDocument/2006/math">
+                        <m:oMathParaPr>
+                          <m:jc m:val="centerGroup"/>
+                        </m:oMathParaPr>
+                        <m:oMath xmlns:m="http://schemas.openxmlformats.org/officeDocument/2006/math">
+                          <m:acc>
+                            <m:accPr>
+                              <m:chr m:val="⃗"/>
+                              <m:ctrlPr>
+                                <a:rPr lang="fr-FR" sz="1050" i="1" smtClean="0">
+                                  <a:latin typeface="Cambria Math"/>
+                                </a:rPr>
+                              </m:ctrlPr>
+                            </m:accPr>
+                            <m:e>
+                              <m:sSub>
+                                <m:sSubPr>
+                                  <m:ctrlPr>
+                                    <a:rPr lang="fr-FR" sz="1050" i="1">
+                                      <a:latin typeface="Cambria Math"/>
+                                    </a:rPr>
+                                  </m:ctrlPr>
+                                </m:sSubPr>
+                                <m:e>
+                                  <m:r>
+                                    <a:rPr lang="fr-FR" sz="1050" i="1">
+                                      <a:latin typeface="Cambria Math"/>
+                                    </a:rPr>
+                                    <m:t>𝑦</m:t>
+                                  </m:r>
+                                </m:e>
+                                <m:sub>
+                                  <m:r>
+                                    <a:rPr lang="fr-FR" sz="1050" b="0" i="1" smtClean="0">
+                                      <a:latin typeface="Cambria Math"/>
+                                    </a:rPr>
+                                    <m:t>2</m:t>
+                                  </m:r>
+                                </m:sub>
+                              </m:sSub>
+                            </m:e>
+                          </m:acc>
+                          <m:r>
+                            <a:rPr lang="fr-FR" sz="1050">
+                              <a:latin typeface="Cambria Math"/>
+                            </a:rPr>
+                            <m:t>=</m:t>
+                          </m:r>
+                          <m:acc>
+                            <m:accPr>
+                              <m:chr m:val="⃗"/>
+                              <m:ctrlPr>
+                                <a:rPr lang="fr-FR" sz="1050" i="1">
+                                  <a:latin typeface="Cambria Math"/>
+                                </a:rPr>
+                              </m:ctrlPr>
+                            </m:accPr>
+                            <m:e>
+                              <m:sSub>
+                                <m:sSubPr>
+                                  <m:ctrlPr>
+                                    <a:rPr lang="fr-FR" sz="1050" i="1">
+                                      <a:latin typeface="Cambria Math"/>
+                                    </a:rPr>
+                                  </m:ctrlPr>
+                                </m:sSubPr>
+                                <m:e>
+                                  <m:r>
+                                    <a:rPr lang="fr-FR" sz="1050" i="1">
+                                      <a:latin typeface="Cambria Math"/>
+                                    </a:rPr>
+                                    <m:t>𝑦</m:t>
+                                  </m:r>
+                                </m:e>
+                                <m:sub>
+                                  <m:r>
+                                    <a:rPr lang="fr-FR" sz="1050" b="0" i="1" smtClean="0">
+                                      <a:latin typeface="Cambria Math"/>
+                                    </a:rPr>
+                                    <m:t>3</m:t>
+                                  </m:r>
+                                </m:sub>
+                              </m:sSub>
+                            </m:e>
+                          </m:acc>
+                        </m:oMath>
+                      </m:oMathPara>
+                    </a14:m>
+                    <a:endParaRPr lang="fr-FR" sz="1050" dirty="0"/>
+                  </a:p>
+                </p:txBody>
+              </p:sp>
+            </mc:Choice>
+            <mc:Fallback>
+              <p:sp>
+                <p:nvSpPr>
+                  <p:cNvPr id="52" name="ZoneTexte 51"/>
+                  <p:cNvSpPr txBox="1">
+                    <a:spLocks noRot="1" noChangeAspect="1" noMove="1" noResize="1" noEditPoints="1" noAdjustHandles="1" noChangeArrowheads="1" noChangeShapeType="1" noTextEdit="1"/>
+                  </p:cNvSpPr>
+                  <p:nvPr/>
+                </p:nvSpPr>
+                <p:spPr>
+                  <a:xfrm>
+                    <a:off x="2782604" y="3504141"/>
+                    <a:ext cx="637268" cy="253916"/>
+                  </a:xfrm>
+                  <a:prstGeom prst="rect">
+                    <a:avLst/>
+                  </a:prstGeom>
+                  <a:blipFill rotWithShape="1">
+                    <a:blip r:embed="rId19"/>
+                    <a:stretch>
+                      <a:fillRect/>
+                    </a:stretch>
+                  </a:blipFill>
+                </p:spPr>
+                <p:txBody>
+                  <a:bodyPr/>
+                  <a:lstStyle/>
+                  <a:p>
+                    <a:r>
+                      <a:rPr lang="fr-FR">
+                        <a:noFill/>
+                      </a:rPr>
+                      <a:t> </a:t>
+                    </a:r>
+                  </a:p>
+                </p:txBody>
+              </p:sp>
+            </mc:Fallback>
+          </mc:AlternateContent>
+        </p:grpSp>
+        <p:sp>
+          <p:nvSpPr>
+            <p:cNvPr id="42" name="Arc 41"/>
+            <p:cNvSpPr/>
+            <p:nvPr/>
+          </p:nvSpPr>
+          <p:spPr>
+            <a:xfrm>
+              <a:off x="478794" y="2940802"/>
+              <a:ext cx="979738" cy="979738"/>
+            </a:xfrm>
+            <a:prstGeom prst="arc">
+              <a:avLst>
+                <a:gd name="adj1" fmla="val 20515322"/>
+                <a:gd name="adj2" fmla="val 0"/>
+              </a:avLst>
+            </a:prstGeom>
+            <a:ln w="12700">
+              <a:solidFill>
+                <a:srgbClr val="7030A0"/>
+              </a:solidFill>
+              <a:headEnd type="stealth" w="sm" len="med"/>
+              <a:tailEnd type="none" w="med" len="lg"/>
+            </a:ln>
+          </p:spPr>
+          <p:style>
+            <a:lnRef idx="1">
+              <a:schemeClr val="accent1"/>
+            </a:lnRef>
+            <a:fillRef idx="0">
+              <a:schemeClr val="accent1"/>
+            </a:fillRef>
+            <a:effectRef idx="0">
+              <a:schemeClr val="accent1"/>
+            </a:effectRef>
+            <a:fontRef idx="minor">
+              <a:schemeClr val="tx1"/>
+            </a:fontRef>
+          </p:style>
+          <p:txBody>
+            <a:bodyPr rtlCol="0" anchor="ctr"/>
+            <a:lstStyle/>
+            <a:p>
+              <a:pPr algn="ctr"/>
+              <a:endParaRPr lang="fr-FR">
+                <a:solidFill>
+                  <a:srgbClr val="7030A0"/>
+                </a:solidFill>
+              </a:endParaRPr>
+            </a:p>
+          </p:txBody>
+        </p:sp>
+        <mc:AlternateContent xmlns:mc="http://schemas.openxmlformats.org/markup-compatibility/2006">
+          <mc:Choice xmlns:a14="http://schemas.microsoft.com/office/drawing/2010/main" Requires="a14">
+            <p:sp>
+              <p:nvSpPr>
+                <p:cNvPr id="43" name="ZoneTexte 42"/>
+                <p:cNvSpPr txBox="1"/>
+                <p:nvPr/>
+              </p:nvSpPr>
+              <p:spPr>
+                <a:xfrm>
+                  <a:off x="1037962" y="3002459"/>
+                  <a:ext cx="689035" cy="301493"/>
+                </a:xfrm>
+                <a:prstGeom prst="rect">
+                  <a:avLst/>
+                </a:prstGeom>
+                <a:noFill/>
+              </p:spPr>
+              <p:txBody>
+                <a:bodyPr wrap="none" rtlCol="0">
+                  <a:spAutoFit/>
+                </a:bodyPr>
+                <a:lstStyle/>
+                <a:p>
+                  <a:pPr/>
+                  <a14:m>
+                    <m:oMathPara xmlns:m="http://schemas.openxmlformats.org/officeDocument/2006/math">
+                      <m:oMathParaPr>
+                        <m:jc m:val="centerGroup"/>
+                      </m:oMathParaPr>
+                      <m:oMath xmlns:m="http://schemas.openxmlformats.org/officeDocument/2006/math">
+                        <m:sSub>
+                          <m:sSubPr>
+                            <m:ctrlPr>
+                              <a:rPr lang="fr-FR" sz="800" b="0" i="1" smtClean="0">
+                                <a:latin typeface="Cambria Math"/>
+                              </a:rPr>
+                            </m:ctrlPr>
+                          </m:sSubPr>
+                          <m:e>
+                            <m:r>
+                              <a:rPr lang="fr-FR" sz="800" b="0" i="1" smtClean="0">
+                                <a:latin typeface="Cambria Math"/>
+                              </a:rPr>
+                              <m:t>𝜃</m:t>
+                            </m:r>
+                          </m:e>
+                          <m:sub>
+                            <m:r>
+                              <a:rPr lang="fr-FR" sz="800" b="0" i="1" smtClean="0">
+                                <a:latin typeface="Cambria Math"/>
+                              </a:rPr>
+                              <m:t>3</m:t>
+                            </m:r>
+                          </m:sub>
+                        </m:sSub>
+                        <m:r>
+                          <a:rPr lang="fr-FR" sz="800" b="0" i="1" smtClean="0">
+                            <a:latin typeface="Cambria Math"/>
+                          </a:rPr>
+                          <m:t>=</m:t>
+                        </m:r>
+                        <m:f>
+                          <m:fPr>
+                            <m:ctrlPr>
+                              <a:rPr lang="fr-FR" sz="800" b="0" i="1" smtClean="0">
+                                <a:latin typeface="Cambria Math"/>
+                              </a:rPr>
+                            </m:ctrlPr>
+                          </m:fPr>
+                          <m:num>
+                            <m:r>
+                              <a:rPr lang="fr-FR" sz="800" b="0" i="1" smtClean="0">
+                                <a:latin typeface="Cambria Math"/>
+                              </a:rPr>
+                              <m:t>𝜋</m:t>
+                            </m:r>
+                          </m:num>
+                          <m:den>
+                            <m:r>
+                              <a:rPr lang="fr-FR" sz="800" b="0" i="1" smtClean="0">
+                                <a:latin typeface="Cambria Math"/>
+                              </a:rPr>
+                              <m:t>2</m:t>
+                            </m:r>
+                          </m:den>
+                        </m:f>
+                        <m:r>
+                          <a:rPr lang="fr-FR" sz="800" b="0" i="1" smtClean="0">
+                            <a:latin typeface="Cambria Math"/>
+                          </a:rPr>
+                          <m:t>−</m:t>
+                        </m:r>
+                        <m:r>
+                          <a:rPr lang="fr-FR" sz="800" b="0" i="1" smtClean="0">
+                            <a:latin typeface="Cambria Math"/>
+                          </a:rPr>
+                          <m:t>𝜃</m:t>
+                        </m:r>
+                      </m:oMath>
+                    </m:oMathPara>
+                  </a14:m>
+                  <a:endParaRPr lang="fr-FR" sz="800" dirty="0"/>
+                </a:p>
+              </p:txBody>
+            </p:sp>
+          </mc:Choice>
+          <mc:Fallback>
+            <p:sp>
+              <p:nvSpPr>
+                <p:cNvPr id="43" name="ZoneTexte 42"/>
+                <p:cNvSpPr txBox="1">
+                  <a:spLocks noRot="1" noChangeAspect="1" noMove="1" noResize="1" noEditPoints="1" noAdjustHandles="1" noChangeArrowheads="1" noChangeShapeType="1" noTextEdit="1"/>
+                </p:cNvSpPr>
+                <p:nvPr/>
+              </p:nvSpPr>
+              <p:spPr>
+                <a:xfrm>
+                  <a:off x="1037962" y="3002459"/>
+                  <a:ext cx="689035" cy="301493"/>
+                </a:xfrm>
+                <a:prstGeom prst="rect">
+                  <a:avLst/>
+                </a:prstGeom>
+                <a:blipFill rotWithShape="1">
+                  <a:blip r:embed="rId20"/>
+                  <a:stretch>
+                    <a:fillRect/>
+                  </a:stretch>
+                </a:blipFill>
+              </p:spPr>
+              <p:txBody>
+                <a:bodyPr/>
+                <a:lstStyle/>
+                <a:p>
+                  <a:r>
+                    <a:rPr lang="fr-FR">
+                      <a:noFill/>
+                    </a:rPr>
+                    <a:t> </a:t>
+                  </a:r>
+                </a:p>
+              </p:txBody>
+            </p:sp>
+          </mc:Fallback>
+        </mc:AlternateContent>
+      </p:grpSp>
+      <p:grpSp>
+        <p:nvGrpSpPr>
+          <p:cNvPr id="57" name="Groupe 56"/>
+          <p:cNvGrpSpPr/>
+          <p:nvPr/>
+        </p:nvGrpSpPr>
+        <p:grpSpPr>
+          <a:xfrm>
+            <a:off x="4647982" y="2464311"/>
+            <a:ext cx="1481280" cy="1458804"/>
+            <a:chOff x="478794" y="2461736"/>
+            <a:chExt cx="1481280" cy="1458804"/>
+          </a:xfrm>
+        </p:grpSpPr>
+        <p:grpSp>
+          <p:nvGrpSpPr>
+            <p:cNvPr id="58" name="Groupe 57"/>
+            <p:cNvGrpSpPr/>
+            <p:nvPr/>
+          </p:nvGrpSpPr>
+          <p:grpSpPr>
+            <a:xfrm>
+              <a:off x="545902" y="2461736"/>
+              <a:ext cx="1414172" cy="1289971"/>
+              <a:chOff x="2713784" y="2468086"/>
+              <a:chExt cx="1414172" cy="1289971"/>
+            </a:xfrm>
+          </p:grpSpPr>
+          <mc:AlternateContent xmlns:mc="http://schemas.openxmlformats.org/markup-compatibility/2006">
+            <mc:Choice xmlns:a14="http://schemas.microsoft.com/office/drawing/2010/main" Requires="a14">
+              <p:sp>
+                <p:nvSpPr>
+                  <p:cNvPr id="61" name="ZoneTexte 60"/>
+                  <p:cNvSpPr txBox="1"/>
+                  <p:nvPr/>
+                </p:nvSpPr>
+                <p:spPr>
+                  <a:xfrm>
+                    <a:off x="3779912" y="3302042"/>
+                    <a:ext cx="348044" cy="253916"/>
+                  </a:xfrm>
+                  <a:prstGeom prst="rect">
+                    <a:avLst/>
+                  </a:prstGeom>
+                  <a:noFill/>
+                </p:spPr>
+                <p:txBody>
+                  <a:bodyPr wrap="none" rtlCol="0">
+                    <a:spAutoFit/>
+                  </a:bodyPr>
+                  <a:lstStyle/>
+                  <a:p>
+                    <a:pPr/>
+                    <a14:m>
+                      <m:oMathPara xmlns:m="http://schemas.openxmlformats.org/officeDocument/2006/math">
+                        <m:oMathParaPr>
+                          <m:jc m:val="centerGroup"/>
+                        </m:oMathParaPr>
+                        <m:oMath xmlns:m="http://schemas.openxmlformats.org/officeDocument/2006/math">
+                          <m:acc>
+                            <m:accPr>
+                              <m:chr m:val="⃗"/>
+                              <m:ctrlPr>
+                                <a:rPr lang="fr-FR" sz="1050" b="0" i="1" smtClean="0">
+                                  <a:latin typeface="Cambria Math"/>
+                                </a:rPr>
+                              </m:ctrlPr>
+                            </m:accPr>
+                            <m:e>
+                              <m:sSub>
+                                <m:sSubPr>
+                                  <m:ctrlPr>
+                                    <a:rPr lang="fr-FR" sz="1050" b="0" i="1" smtClean="0">
+                                      <a:latin typeface="Cambria Math"/>
+                                    </a:rPr>
+                                  </m:ctrlPr>
+                                </m:sSubPr>
+                                <m:e>
+                                  <m:r>
+                                    <a:rPr lang="fr-FR" sz="1050" i="1" smtClean="0">
+                                      <a:latin typeface="Cambria Math"/>
+                                    </a:rPr>
+                                    <m:t>𝑦</m:t>
+                                  </m:r>
+                                </m:e>
+                                <m:sub>
+                                  <m:r>
+                                    <a:rPr lang="fr-FR" sz="1050" b="0" i="1" smtClean="0">
+                                      <a:latin typeface="Cambria Math"/>
+                                    </a:rPr>
+                                    <m:t>3</m:t>
+                                  </m:r>
+                                </m:sub>
+                              </m:sSub>
+                            </m:e>
+                          </m:acc>
+                        </m:oMath>
+                      </m:oMathPara>
+                    </a14:m>
+                    <a:endParaRPr lang="fr-FR" sz="1050" dirty="0"/>
+                  </a:p>
+                </p:txBody>
+              </p:sp>
+            </mc:Choice>
+            <mc:Fallback>
+              <p:sp>
+                <p:nvSpPr>
+                  <p:cNvPr id="61" name="ZoneTexte 60"/>
+                  <p:cNvSpPr txBox="1">
+                    <a:spLocks noRot="1" noChangeAspect="1" noMove="1" noResize="1" noEditPoints="1" noAdjustHandles="1" noChangeArrowheads="1" noChangeShapeType="1" noTextEdit="1"/>
+                  </p:cNvSpPr>
+                  <p:nvPr/>
+                </p:nvSpPr>
+                <p:spPr>
+                  <a:xfrm>
+                    <a:off x="3779912" y="3302042"/>
+                    <a:ext cx="348044" cy="253916"/>
+                  </a:xfrm>
+                  <a:prstGeom prst="rect">
+                    <a:avLst/>
+                  </a:prstGeom>
+                  <a:blipFill rotWithShape="1">
+                    <a:blip r:embed="rId21"/>
+                    <a:stretch>
+                      <a:fillRect/>
+                    </a:stretch>
+                  </a:blipFill>
+                </p:spPr>
+                <p:txBody>
+                  <a:bodyPr/>
+                  <a:lstStyle/>
+                  <a:p>
+                    <a:r>
+                      <a:rPr lang="fr-FR">
+                        <a:noFill/>
+                      </a:rPr>
+                      <a:t> </a:t>
+                    </a:r>
+                  </a:p>
+                </p:txBody>
+              </p:sp>
+            </mc:Fallback>
+          </mc:AlternateContent>
+          <p:grpSp>
+            <p:nvGrpSpPr>
+              <p:cNvPr id="62" name="Groupe 61"/>
+              <p:cNvGrpSpPr/>
+              <p:nvPr/>
+            </p:nvGrpSpPr>
+            <p:grpSpPr>
+              <a:xfrm>
+                <a:off x="3131840" y="2722002"/>
+                <a:ext cx="706997" cy="706998"/>
+                <a:chOff x="3131840" y="2722002"/>
+                <a:chExt cx="706997" cy="706998"/>
+              </a:xfrm>
+            </p:grpSpPr>
+            <p:cxnSp>
+              <p:nvCxnSpPr>
+                <p:cNvPr id="72" name="Connecteur droit avec flèche 71"/>
+                <p:cNvCxnSpPr/>
+                <p:nvPr/>
+              </p:nvCxnSpPr>
+              <p:spPr>
+                <a:xfrm>
+                  <a:off x="3131840" y="3429000"/>
+                  <a:ext cx="706997" cy="0"/>
+                </a:xfrm>
+                <a:prstGeom prst="straightConnector1">
+                  <a:avLst/>
+                </a:prstGeom>
+                <a:ln w="12700">
+                  <a:solidFill>
+                    <a:schemeClr val="accent5">
+                      <a:lumMod val="50000"/>
+                    </a:schemeClr>
+                  </a:solidFill>
+                  <a:tailEnd type="stealth" w="med" len="lg"/>
+                </a:ln>
+              </p:spPr>
+              <p:style>
+                <a:lnRef idx="1">
+                  <a:schemeClr val="accent1"/>
+                </a:lnRef>
+                <a:fillRef idx="0">
+                  <a:schemeClr val="accent1"/>
+                </a:fillRef>
+                <a:effectRef idx="0">
+                  <a:schemeClr val="accent1"/>
+                </a:effectRef>
+                <a:fontRef idx="minor">
+                  <a:schemeClr val="tx1"/>
+                </a:fontRef>
+              </p:style>
+            </p:cxnSp>
+            <p:cxnSp>
+              <p:nvCxnSpPr>
+                <p:cNvPr id="73" name="Connecteur droit avec flèche 72"/>
+                <p:cNvCxnSpPr/>
+                <p:nvPr/>
+              </p:nvCxnSpPr>
+              <p:spPr>
+                <a:xfrm rot="16200000">
+                  <a:off x="2778342" y="3075501"/>
+                  <a:ext cx="706997" cy="0"/>
+                </a:xfrm>
+                <a:prstGeom prst="straightConnector1">
+                  <a:avLst/>
+                </a:prstGeom>
+                <a:ln w="12700">
+                  <a:solidFill>
+                    <a:schemeClr val="accent5">
+                      <a:lumMod val="50000"/>
+                    </a:schemeClr>
+                  </a:solidFill>
+                  <a:tailEnd type="stealth" w="med" len="lg"/>
+                </a:ln>
+              </p:spPr>
+              <p:style>
+                <a:lnRef idx="1">
+                  <a:schemeClr val="accent1"/>
+                </a:lnRef>
+                <a:fillRef idx="0">
+                  <a:schemeClr val="accent1"/>
+                </a:fillRef>
+                <a:effectRef idx="0">
+                  <a:schemeClr val="accent1"/>
+                </a:effectRef>
+                <a:fontRef idx="minor">
+                  <a:schemeClr val="tx1"/>
+                </a:fontRef>
+              </p:style>
+            </p:cxnSp>
+          </p:grpSp>
+          <mc:AlternateContent xmlns:mc="http://schemas.openxmlformats.org/markup-compatibility/2006">
+            <mc:Choice xmlns:a14="http://schemas.microsoft.com/office/drawing/2010/main" Requires="a14">
+              <p:sp>
+                <p:nvSpPr>
+                  <p:cNvPr id="63" name="ZoneTexte 62"/>
+                  <p:cNvSpPr txBox="1"/>
+                  <p:nvPr/>
+                </p:nvSpPr>
+                <p:spPr>
+                  <a:xfrm>
+                    <a:off x="2959613" y="2468086"/>
+                    <a:ext cx="339260" cy="253916"/>
+                  </a:xfrm>
+                  <a:prstGeom prst="rect">
+                    <a:avLst/>
+                  </a:prstGeom>
+                  <a:noFill/>
+                </p:spPr>
+                <p:txBody>
+                  <a:bodyPr wrap="none" rtlCol="0">
+                    <a:spAutoFit/>
+                  </a:bodyPr>
+                  <a:lstStyle/>
+                  <a:p>
+                    <a:pPr/>
+                    <a14:m>
+                      <m:oMathPara xmlns:m="http://schemas.openxmlformats.org/officeDocument/2006/math">
+                        <m:oMathParaPr>
+                          <m:jc m:val="centerGroup"/>
+                        </m:oMathParaPr>
+                        <m:oMath xmlns:m="http://schemas.openxmlformats.org/officeDocument/2006/math">
+                          <m:acc>
+                            <m:accPr>
+                              <m:chr m:val="⃗"/>
+                              <m:ctrlPr>
+                                <a:rPr lang="fr-FR" sz="1050" b="0" i="1" smtClean="0">
+                                  <a:latin typeface="Cambria Math"/>
+                                </a:rPr>
+                              </m:ctrlPr>
+                            </m:accPr>
+                            <m:e>
+                              <m:sSub>
+                                <m:sSubPr>
+                                  <m:ctrlPr>
+                                    <a:rPr lang="fr-FR" sz="1050" b="0" i="1" smtClean="0">
+                                      <a:latin typeface="Cambria Math"/>
+                                    </a:rPr>
+                                  </m:ctrlPr>
+                                </m:sSubPr>
+                                <m:e>
+                                  <m:r>
+                                    <a:rPr lang="fr-FR" sz="1050" i="1" smtClean="0">
+                                      <a:latin typeface="Cambria Math"/>
+                                    </a:rPr>
+                                    <m:t>𝑧</m:t>
+                                  </m:r>
+                                </m:e>
+                                <m:sub>
+                                  <m:r>
+                                    <a:rPr lang="fr-FR" sz="1050" b="0" i="1" smtClean="0">
+                                      <a:latin typeface="Cambria Math"/>
+                                    </a:rPr>
+                                    <m:t>3</m:t>
+                                  </m:r>
+                                </m:sub>
+                              </m:sSub>
+                            </m:e>
+                          </m:acc>
+                        </m:oMath>
+                      </m:oMathPara>
+                    </a14:m>
+                    <a:endParaRPr lang="fr-FR" sz="1050" dirty="0"/>
+                  </a:p>
+                </p:txBody>
+              </p:sp>
+            </mc:Choice>
+            <mc:Fallback>
+              <p:sp>
+                <p:nvSpPr>
+                  <p:cNvPr id="63" name="ZoneTexte 62"/>
+                  <p:cNvSpPr txBox="1">
+                    <a:spLocks noRot="1" noChangeAspect="1" noMove="1" noResize="1" noEditPoints="1" noAdjustHandles="1" noChangeArrowheads="1" noChangeShapeType="1" noTextEdit="1"/>
+                  </p:cNvSpPr>
+                  <p:nvPr/>
+                </p:nvSpPr>
+                <p:spPr>
+                  <a:xfrm>
+                    <a:off x="2959613" y="2468086"/>
+                    <a:ext cx="339260" cy="253916"/>
+                  </a:xfrm>
+                  <a:prstGeom prst="rect">
+                    <a:avLst/>
+                  </a:prstGeom>
+                  <a:blipFill rotWithShape="1">
+                    <a:blip r:embed="rId22"/>
+                    <a:stretch>
+                      <a:fillRect/>
+                    </a:stretch>
+                  </a:blipFill>
+                </p:spPr>
+                <p:txBody>
+                  <a:bodyPr/>
+                  <a:lstStyle/>
+                  <a:p>
+                    <a:r>
+                      <a:rPr lang="fr-FR">
+                        <a:noFill/>
+                      </a:rPr>
+                      <a:t> </a:t>
+                    </a:r>
+                  </a:p>
+                </p:txBody>
+              </p:sp>
+            </mc:Fallback>
+          </mc:AlternateContent>
+          <p:grpSp>
+            <p:nvGrpSpPr>
+              <p:cNvPr id="64" name="Groupe 63"/>
+              <p:cNvGrpSpPr/>
+              <p:nvPr/>
+            </p:nvGrpSpPr>
+            <p:grpSpPr>
+              <a:xfrm rot="20700000">
+                <a:off x="3034278" y="2642555"/>
+                <a:ext cx="706997" cy="706998"/>
+                <a:chOff x="3131840" y="2722002"/>
+                <a:chExt cx="706997" cy="706998"/>
+              </a:xfrm>
+            </p:grpSpPr>
+            <p:cxnSp>
+              <p:nvCxnSpPr>
+                <p:cNvPr id="70" name="Connecteur droit avec flèche 69"/>
+                <p:cNvCxnSpPr/>
+                <p:nvPr/>
+              </p:nvCxnSpPr>
+              <p:spPr>
+                <a:xfrm>
+                  <a:off x="3131840" y="3429000"/>
+                  <a:ext cx="706997" cy="0"/>
+                </a:xfrm>
+                <a:prstGeom prst="straightConnector1">
+                  <a:avLst/>
+                </a:prstGeom>
+                <a:ln w="12700">
+                  <a:solidFill>
+                    <a:srgbClr val="7030A0"/>
+                  </a:solidFill>
+                  <a:tailEnd type="stealth" w="med" len="lg"/>
+                </a:ln>
+              </p:spPr>
+              <p:style>
+                <a:lnRef idx="1">
+                  <a:schemeClr val="accent1"/>
+                </a:lnRef>
+                <a:fillRef idx="0">
+                  <a:schemeClr val="accent1"/>
+                </a:fillRef>
+                <a:effectRef idx="0">
+                  <a:schemeClr val="accent1"/>
+                </a:effectRef>
+                <a:fontRef idx="minor">
+                  <a:schemeClr val="tx1"/>
+                </a:fontRef>
+              </p:style>
+            </p:cxnSp>
+            <p:cxnSp>
+              <p:nvCxnSpPr>
+                <p:cNvPr id="71" name="Connecteur droit avec flèche 70"/>
+                <p:cNvCxnSpPr/>
+                <p:nvPr/>
+              </p:nvCxnSpPr>
+              <p:spPr>
+                <a:xfrm rot="16200000">
+                  <a:off x="2778342" y="3075501"/>
+                  <a:ext cx="706997" cy="0"/>
+                </a:xfrm>
+                <a:prstGeom prst="straightConnector1">
+                  <a:avLst/>
+                </a:prstGeom>
+                <a:ln w="12700">
+                  <a:solidFill>
+                    <a:srgbClr val="7030A0"/>
+                  </a:solidFill>
+                  <a:tailEnd type="stealth" w="med" len="lg"/>
+                </a:ln>
+              </p:spPr>
+              <p:style>
+                <a:lnRef idx="1">
+                  <a:schemeClr val="accent1"/>
+                </a:lnRef>
+                <a:fillRef idx="0">
+                  <a:schemeClr val="accent1"/>
+                </a:fillRef>
+                <a:effectRef idx="0">
+                  <a:schemeClr val="accent1"/>
+                </a:effectRef>
+                <a:fontRef idx="minor">
+                  <a:schemeClr val="tx1"/>
+                </a:fontRef>
+              </p:style>
+            </p:cxnSp>
+          </p:grpSp>
+          <mc:AlternateContent xmlns:mc="http://schemas.openxmlformats.org/markup-compatibility/2006">
+            <mc:Choice xmlns:a14="http://schemas.microsoft.com/office/drawing/2010/main" Requires="a14">
+              <p:sp>
+                <p:nvSpPr>
+                  <p:cNvPr id="65" name="ZoneTexte 64"/>
+                  <p:cNvSpPr txBox="1"/>
+                  <p:nvPr/>
+                </p:nvSpPr>
+                <p:spPr>
+                  <a:xfrm>
+                    <a:off x="3779912" y="3099143"/>
+                    <a:ext cx="342273" cy="253916"/>
+                  </a:xfrm>
+                  <a:prstGeom prst="rect">
+                    <a:avLst/>
+                  </a:prstGeom>
+                  <a:noFill/>
+                </p:spPr>
+                <p:txBody>
+                  <a:bodyPr wrap="none" rtlCol="0">
+                    <a:spAutoFit/>
+                  </a:bodyPr>
+                  <a:lstStyle/>
+                  <a:p>
+                    <a:pPr/>
+                    <a14:m>
+                      <m:oMathPara xmlns:m="http://schemas.openxmlformats.org/officeDocument/2006/math">
+                        <m:oMathParaPr>
+                          <m:jc m:val="centerGroup"/>
+                        </m:oMathParaPr>
+                        <m:oMath xmlns:m="http://schemas.openxmlformats.org/officeDocument/2006/math">
+                          <m:acc>
+                            <m:accPr>
+                              <m:chr m:val="⃗"/>
+                              <m:ctrlPr>
+                                <a:rPr lang="fr-FR" sz="1050" b="0" i="1" smtClean="0">
+                                  <a:latin typeface="Cambria Math"/>
+                                </a:rPr>
+                              </m:ctrlPr>
+                            </m:accPr>
+                            <m:e>
+                              <m:sSub>
+                                <m:sSubPr>
+                                  <m:ctrlPr>
+                                    <a:rPr lang="fr-FR" sz="1050" b="0" i="1" smtClean="0">
+                                      <a:latin typeface="Cambria Math"/>
+                                    </a:rPr>
+                                  </m:ctrlPr>
+                                </m:sSubPr>
+                                <m:e>
+                                  <m:r>
+                                    <a:rPr lang="fr-FR" sz="1050" b="0" i="1" smtClean="0">
+                                      <a:latin typeface="Cambria Math"/>
+                                    </a:rPr>
+                                    <m:t>𝑦</m:t>
+                                  </m:r>
+                                </m:e>
+                                <m:sub>
+                                  <m:r>
+                                    <a:rPr lang="fr-FR" sz="1050" b="0" i="1" smtClean="0">
+                                      <a:latin typeface="Cambria Math"/>
+                                    </a:rPr>
+                                    <m:t>4</m:t>
+                                  </m:r>
+                                </m:sub>
+                              </m:sSub>
+                            </m:e>
+                          </m:acc>
+                        </m:oMath>
+                      </m:oMathPara>
+                    </a14:m>
+                    <a:endParaRPr lang="fr-FR" sz="1050" dirty="0"/>
+                  </a:p>
+                </p:txBody>
+              </p:sp>
+            </mc:Choice>
+            <mc:Fallback>
+              <p:sp>
+                <p:nvSpPr>
+                  <p:cNvPr id="65" name="ZoneTexte 64"/>
+                  <p:cNvSpPr txBox="1">
+                    <a:spLocks noRot="1" noChangeAspect="1" noMove="1" noResize="1" noEditPoints="1" noAdjustHandles="1" noChangeArrowheads="1" noChangeShapeType="1" noTextEdit="1"/>
+                  </p:cNvSpPr>
+                  <p:nvPr/>
+                </p:nvSpPr>
+                <p:spPr>
+                  <a:xfrm>
+                    <a:off x="3779912" y="3099143"/>
+                    <a:ext cx="342273" cy="253916"/>
+                  </a:xfrm>
+                  <a:prstGeom prst="rect">
+                    <a:avLst/>
+                  </a:prstGeom>
+                  <a:blipFill rotWithShape="1">
+                    <a:blip r:embed="rId23"/>
+                    <a:stretch>
+                      <a:fillRect/>
+                    </a:stretch>
+                  </a:blipFill>
+                </p:spPr>
+                <p:txBody>
+                  <a:bodyPr/>
+                  <a:lstStyle/>
+                  <a:p>
+                    <a:r>
+                      <a:rPr lang="fr-FR">
+                        <a:noFill/>
+                      </a:rPr>
+                      <a:t> </a:t>
+                    </a:r>
+                  </a:p>
+                </p:txBody>
+              </p:sp>
+            </mc:Fallback>
+          </mc:AlternateContent>
+          <mc:AlternateContent xmlns:mc="http://schemas.openxmlformats.org/markup-compatibility/2006">
+            <mc:Choice xmlns:a14="http://schemas.microsoft.com/office/drawing/2010/main" Requires="a14">
+              <p:sp>
+                <p:nvSpPr>
+                  <p:cNvPr id="66" name="ZoneTexte 65"/>
+                  <p:cNvSpPr txBox="1"/>
+                  <p:nvPr/>
+                </p:nvSpPr>
+                <p:spPr>
+                  <a:xfrm>
+                    <a:off x="2713784" y="2487180"/>
+                    <a:ext cx="339260" cy="253916"/>
+                  </a:xfrm>
+                  <a:prstGeom prst="rect">
+                    <a:avLst/>
+                  </a:prstGeom>
+                  <a:noFill/>
+                </p:spPr>
+                <p:txBody>
+                  <a:bodyPr wrap="none" rtlCol="0">
+                    <a:spAutoFit/>
+                  </a:bodyPr>
+                  <a:lstStyle/>
+                  <a:p>
+                    <a:pPr/>
+                    <a14:m>
+                      <m:oMathPara xmlns:m="http://schemas.openxmlformats.org/officeDocument/2006/math">
+                        <m:oMathParaPr>
+                          <m:jc m:val="centerGroup"/>
+                        </m:oMathParaPr>
+                        <m:oMath xmlns:m="http://schemas.openxmlformats.org/officeDocument/2006/math">
+                          <m:acc>
+                            <m:accPr>
+                              <m:chr m:val="⃗"/>
+                              <m:ctrlPr>
+                                <a:rPr lang="fr-FR" sz="1050" b="0" i="1" smtClean="0">
+                                  <a:latin typeface="Cambria Math"/>
+                                </a:rPr>
+                              </m:ctrlPr>
+                            </m:accPr>
+                            <m:e>
+                              <m:sSub>
+                                <m:sSubPr>
+                                  <m:ctrlPr>
+                                    <a:rPr lang="fr-FR" sz="1050" b="0" i="1" smtClean="0">
+                                      <a:latin typeface="Cambria Math"/>
+                                    </a:rPr>
+                                  </m:ctrlPr>
+                                </m:sSubPr>
+                                <m:e>
+                                  <m:r>
+                                    <a:rPr lang="fr-FR" sz="1050" b="0" i="1" smtClean="0">
+                                      <a:latin typeface="Cambria Math"/>
+                                    </a:rPr>
+                                    <m:t>𝑧</m:t>
+                                  </m:r>
+                                </m:e>
+                                <m:sub>
+                                  <m:r>
+                                    <a:rPr lang="fr-FR" sz="1050" b="0" i="1" smtClean="0">
+                                      <a:latin typeface="Cambria Math"/>
+                                    </a:rPr>
+                                    <m:t>4</m:t>
+                                  </m:r>
+                                </m:sub>
+                              </m:sSub>
+                            </m:e>
+                          </m:acc>
+                        </m:oMath>
+                      </m:oMathPara>
+                    </a14:m>
+                    <a:endParaRPr lang="fr-FR" sz="1050" dirty="0"/>
+                  </a:p>
+                </p:txBody>
+              </p:sp>
+            </mc:Choice>
+            <mc:Fallback>
+              <p:sp>
+                <p:nvSpPr>
+                  <p:cNvPr id="66" name="ZoneTexte 65"/>
+                  <p:cNvSpPr txBox="1">
+                    <a:spLocks noRot="1" noChangeAspect="1" noMove="1" noResize="1" noEditPoints="1" noAdjustHandles="1" noChangeArrowheads="1" noChangeShapeType="1" noTextEdit="1"/>
+                  </p:cNvSpPr>
+                  <p:nvPr/>
+                </p:nvSpPr>
+                <p:spPr>
+                  <a:xfrm>
+                    <a:off x="2713784" y="2487180"/>
+                    <a:ext cx="339260" cy="253916"/>
+                  </a:xfrm>
+                  <a:prstGeom prst="rect">
+                    <a:avLst/>
+                  </a:prstGeom>
+                  <a:blipFill rotWithShape="1">
+                    <a:blip r:embed="rId24"/>
+                    <a:stretch>
+                      <a:fillRect/>
+                    </a:stretch>
+                  </a:blipFill>
+                </p:spPr>
+                <p:txBody>
+                  <a:bodyPr/>
+                  <a:lstStyle/>
+                  <a:p>
+                    <a:r>
+                      <a:rPr lang="fr-FR">
+                        <a:noFill/>
+                      </a:rPr>
+                      <a:t> </a:t>
+                    </a:r>
+                  </a:p>
+                </p:txBody>
+              </p:sp>
+            </mc:Fallback>
+          </mc:AlternateContent>
+          <p:sp>
+            <p:nvSpPr>
+              <p:cNvPr id="67" name="Ellipse 66"/>
+              <p:cNvSpPr/>
+              <p:nvPr/>
+            </p:nvSpPr>
+            <p:spPr>
+              <a:xfrm>
+                <a:off x="3061828" y="3356992"/>
+                <a:ext cx="144016" cy="144016"/>
+              </a:xfrm>
+              <a:prstGeom prst="ellipse">
+                <a:avLst/>
+              </a:prstGeom>
+              <a:solidFill>
+                <a:schemeClr val="bg1"/>
+              </a:solidFill>
+              <a:ln w="12700">
+                <a:solidFill>
+                  <a:srgbClr val="7030A0"/>
+                </a:solidFill>
+                <a:tailEnd type="stealth" w="med" len="lg"/>
+              </a:ln>
+            </p:spPr>
+            <p:style>
+              <a:lnRef idx="1">
+                <a:schemeClr val="accent1"/>
+              </a:lnRef>
+              <a:fillRef idx="0">
+                <a:schemeClr val="accent1"/>
+              </a:fillRef>
+              <a:effectRef idx="0">
+                <a:schemeClr val="accent1"/>
+              </a:effectRef>
+              <a:fontRef idx="minor">
+                <a:schemeClr val="tx1"/>
+              </a:fontRef>
+            </p:style>
+            <p:txBody>
+              <a:bodyPr rtlCol="0" anchor="ctr"/>
+              <a:lstStyle/>
+              <a:p>
+                <a:pPr algn="ctr"/>
+                <a:endParaRPr lang="fr-FR"/>
+              </a:p>
+            </p:txBody>
+          </p:sp>
+          <p:sp>
+            <p:nvSpPr>
+              <p:cNvPr id="68" name="Ellipse 67"/>
+              <p:cNvSpPr/>
+              <p:nvPr/>
+            </p:nvSpPr>
+            <p:spPr>
+              <a:xfrm>
+                <a:off x="3106398" y="3403558"/>
+                <a:ext cx="50884" cy="50884"/>
+              </a:xfrm>
+              <a:prstGeom prst="ellipse">
+                <a:avLst/>
+              </a:prstGeom>
+              <a:solidFill>
+                <a:srgbClr val="7030A0"/>
+              </a:solidFill>
+              <a:ln w="12700">
+                <a:solidFill>
+                  <a:srgbClr val="7030A0"/>
+                </a:solidFill>
+                <a:tailEnd type="stealth" w="med" len="lg"/>
+              </a:ln>
+            </p:spPr>
+            <p:style>
+              <a:lnRef idx="1">
+                <a:schemeClr val="accent1"/>
+              </a:lnRef>
+              <a:fillRef idx="0">
+                <a:schemeClr val="accent1"/>
+              </a:fillRef>
+              <a:effectRef idx="0">
+                <a:schemeClr val="accent1"/>
+              </a:effectRef>
+              <a:fontRef idx="minor">
+                <a:schemeClr val="tx1"/>
+              </a:fontRef>
+            </p:style>
+            <p:txBody>
+              <a:bodyPr rtlCol="0" anchor="ctr"/>
+              <a:lstStyle/>
+              <a:p>
+                <a:pPr algn="ctr"/>
+                <a:endParaRPr lang="fr-FR"/>
+              </a:p>
+            </p:txBody>
+          </p:sp>
+          <mc:AlternateContent xmlns:mc="http://schemas.openxmlformats.org/markup-compatibility/2006">
+            <mc:Choice xmlns:a14="http://schemas.microsoft.com/office/drawing/2010/main" Requires="a14">
+              <p:sp>
+                <p:nvSpPr>
+                  <p:cNvPr id="69" name="ZoneTexte 68"/>
+                  <p:cNvSpPr txBox="1"/>
+                  <p:nvPr/>
+                </p:nvSpPr>
+                <p:spPr>
+                  <a:xfrm>
+                    <a:off x="2782604" y="3504141"/>
+                    <a:ext cx="637268" cy="253916"/>
+                  </a:xfrm>
+                  <a:prstGeom prst="rect">
+                    <a:avLst/>
+                  </a:prstGeom>
+                  <a:noFill/>
+                </p:spPr>
+                <p:txBody>
+                  <a:bodyPr wrap="square" rtlCol="0">
+                    <a:spAutoFit/>
+                  </a:bodyPr>
+                  <a:lstStyle/>
+                  <a:p>
+                    <a14:m>
+                      <m:oMathPara xmlns:m="http://schemas.openxmlformats.org/officeDocument/2006/math">
+                        <m:oMathParaPr>
+                          <m:jc m:val="centerGroup"/>
+                        </m:oMathParaPr>
+                        <m:oMath xmlns:m="http://schemas.openxmlformats.org/officeDocument/2006/math">
+                          <m:acc>
+                            <m:accPr>
+                              <m:chr m:val="⃗"/>
+                              <m:ctrlPr>
+                                <a:rPr lang="fr-FR" sz="1050" i="1" smtClean="0">
+                                  <a:latin typeface="Cambria Math"/>
+                                </a:rPr>
+                              </m:ctrlPr>
+                            </m:accPr>
+                            <m:e>
+                              <m:sSub>
+                                <m:sSubPr>
+                                  <m:ctrlPr>
+                                    <a:rPr lang="fr-FR" sz="1050" b="0" i="1" smtClean="0">
+                                      <a:latin typeface="Cambria Math"/>
+                                    </a:rPr>
+                                  </m:ctrlPr>
+                                </m:sSubPr>
+                                <m:e>
+                                  <m:r>
+                                    <a:rPr lang="fr-FR" sz="1050" i="1" smtClean="0">
+                                      <a:latin typeface="Cambria Math"/>
+                                    </a:rPr>
+                                    <m:t>𝑥</m:t>
+                                  </m:r>
+                                </m:e>
+                                <m:sub>
+                                  <m:r>
+                                    <a:rPr lang="fr-FR" sz="1050" b="0" i="1" smtClean="0">
+                                      <a:latin typeface="Cambria Math"/>
+                                    </a:rPr>
+                                    <m:t>3</m:t>
+                                  </m:r>
+                                </m:sub>
+                              </m:sSub>
+                            </m:e>
+                          </m:acc>
+                          <m:r>
+                            <a:rPr lang="fr-FR" sz="1050" b="0" i="0" smtClean="0">
+                              <a:latin typeface="Cambria Math"/>
+                            </a:rPr>
+                            <m:t>=</m:t>
+                          </m:r>
+                          <m:acc>
+                            <m:accPr>
+                              <m:chr m:val="⃗"/>
+                              <m:ctrlPr>
+                                <a:rPr lang="fr-FR" sz="1050" b="0" i="1" smtClean="0">
+                                  <a:latin typeface="Cambria Math"/>
+                                </a:rPr>
+                              </m:ctrlPr>
+                            </m:accPr>
+                            <m:e>
+                              <m:sSub>
+                                <m:sSubPr>
+                                  <m:ctrlPr>
+                                    <a:rPr lang="fr-FR" sz="1050" b="0" i="1" smtClean="0">
+                                      <a:latin typeface="Cambria Math"/>
+                                    </a:rPr>
+                                  </m:ctrlPr>
+                                </m:sSubPr>
+                                <m:e>
+                                  <m:r>
+                                    <a:rPr lang="fr-FR" sz="1050" b="0" i="1" smtClean="0">
+                                      <a:latin typeface="Cambria Math"/>
+                                    </a:rPr>
+                                    <m:t>𝑥</m:t>
+                                  </m:r>
+                                </m:e>
+                                <m:sub>
+                                  <m:r>
+                                    <a:rPr lang="fr-FR" sz="1050" b="0" i="1" smtClean="0">
+                                      <a:latin typeface="Cambria Math"/>
+                                    </a:rPr>
+                                    <m:t>4</m:t>
+                                  </m:r>
+                                </m:sub>
+                              </m:sSub>
+                            </m:e>
+                          </m:acc>
+                        </m:oMath>
+                      </m:oMathPara>
+                    </a14:m>
+                    <a:endParaRPr lang="fr-FR" sz="1050" dirty="0"/>
+                  </a:p>
+                </p:txBody>
+              </p:sp>
+            </mc:Choice>
+            <mc:Fallback>
+              <p:sp>
+                <p:nvSpPr>
+                  <p:cNvPr id="69" name="ZoneTexte 68"/>
+                  <p:cNvSpPr txBox="1">
+                    <a:spLocks noRot="1" noChangeAspect="1" noMove="1" noResize="1" noEditPoints="1" noAdjustHandles="1" noChangeArrowheads="1" noChangeShapeType="1" noTextEdit="1"/>
+                  </p:cNvSpPr>
+                  <p:nvPr/>
+                </p:nvSpPr>
+                <p:spPr>
+                  <a:xfrm>
+                    <a:off x="2782604" y="3504141"/>
+                    <a:ext cx="637268" cy="253916"/>
+                  </a:xfrm>
+                  <a:prstGeom prst="rect">
+                    <a:avLst/>
+                  </a:prstGeom>
+                  <a:blipFill rotWithShape="1">
+                    <a:blip r:embed="rId25"/>
+                    <a:stretch>
+                      <a:fillRect/>
+                    </a:stretch>
+                  </a:blipFill>
+                </p:spPr>
+                <p:txBody>
+                  <a:bodyPr/>
+                  <a:lstStyle/>
+                  <a:p>
+                    <a:r>
+                      <a:rPr lang="fr-FR">
+                        <a:noFill/>
+                      </a:rPr>
+                      <a:t> </a:t>
+                    </a:r>
+                  </a:p>
+                </p:txBody>
+              </p:sp>
+            </mc:Fallback>
+          </mc:AlternateContent>
+        </p:grpSp>
+        <p:sp>
+          <p:nvSpPr>
+            <p:cNvPr id="59" name="Arc 58"/>
+            <p:cNvSpPr/>
+            <p:nvPr/>
+          </p:nvSpPr>
+          <p:spPr>
+            <a:xfrm>
+              <a:off x="478794" y="2940802"/>
+              <a:ext cx="979738" cy="979738"/>
+            </a:xfrm>
+            <a:prstGeom prst="arc">
+              <a:avLst>
+                <a:gd name="adj1" fmla="val 20515322"/>
+                <a:gd name="adj2" fmla="val 0"/>
+              </a:avLst>
+            </a:prstGeom>
+            <a:ln w="12700">
+              <a:solidFill>
+                <a:srgbClr val="7030A0"/>
+              </a:solidFill>
+              <a:headEnd type="stealth" w="sm" len="med"/>
+              <a:tailEnd type="none" w="med" len="lg"/>
+            </a:ln>
+          </p:spPr>
+          <p:style>
+            <a:lnRef idx="1">
+              <a:schemeClr val="accent1"/>
+            </a:lnRef>
+            <a:fillRef idx="0">
+              <a:schemeClr val="accent1"/>
+            </a:fillRef>
+            <a:effectRef idx="0">
+              <a:schemeClr val="accent1"/>
+            </a:effectRef>
+            <a:fontRef idx="minor">
+              <a:schemeClr val="tx1"/>
+            </a:fontRef>
+          </p:style>
+          <p:txBody>
+            <a:bodyPr rtlCol="0" anchor="ctr"/>
+            <a:lstStyle/>
+            <a:p>
+              <a:pPr algn="ctr"/>
+              <a:endParaRPr lang="fr-FR">
+                <a:solidFill>
+                  <a:srgbClr val="7030A0"/>
+                </a:solidFill>
+              </a:endParaRPr>
+            </a:p>
+          </p:txBody>
+        </p:sp>
+        <mc:AlternateContent xmlns:mc="http://schemas.openxmlformats.org/markup-compatibility/2006">
+          <mc:Choice xmlns:a14="http://schemas.microsoft.com/office/drawing/2010/main" Requires="a14">
+            <p:sp>
+              <p:nvSpPr>
+                <p:cNvPr id="60" name="ZoneTexte 59"/>
+                <p:cNvSpPr txBox="1"/>
+                <p:nvPr/>
+              </p:nvSpPr>
+              <p:spPr>
+                <a:xfrm>
+                  <a:off x="1318173" y="3106208"/>
+                  <a:ext cx="278218" cy="215444"/>
+                </a:xfrm>
+                <a:prstGeom prst="rect">
+                  <a:avLst/>
+                </a:prstGeom>
+                <a:noFill/>
+              </p:spPr>
+              <p:txBody>
+                <a:bodyPr wrap="none" rtlCol="0">
+                  <a:spAutoFit/>
+                </a:bodyPr>
+                <a:lstStyle/>
+                <a:p>
+                  <a:pPr/>
+                  <a14:m>
+                    <m:oMathPara xmlns:m="http://schemas.openxmlformats.org/officeDocument/2006/math">
+                      <m:oMathParaPr>
+                        <m:jc m:val="centerGroup"/>
+                      </m:oMathParaPr>
+                      <m:oMath xmlns:m="http://schemas.openxmlformats.org/officeDocument/2006/math">
+                        <m:r>
+                          <a:rPr lang="fr-FR" sz="800" b="0" i="1" smtClean="0">
+                            <a:latin typeface="Cambria Math"/>
+                          </a:rPr>
+                          <m:t>𝜑</m:t>
+                        </m:r>
+                      </m:oMath>
+                    </m:oMathPara>
+                  </a14:m>
+                  <a:endParaRPr lang="fr-FR" sz="800" dirty="0"/>
+                </a:p>
+              </p:txBody>
+            </p:sp>
+          </mc:Choice>
+          <mc:Fallback>
+            <p:sp>
+              <p:nvSpPr>
+                <p:cNvPr id="60" name="ZoneTexte 59"/>
+                <p:cNvSpPr txBox="1">
+                  <a:spLocks noRot="1" noChangeAspect="1" noMove="1" noResize="1" noEditPoints="1" noAdjustHandles="1" noChangeArrowheads="1" noChangeShapeType="1" noTextEdit="1"/>
+                </p:cNvSpPr>
+                <p:nvPr/>
+              </p:nvSpPr>
+              <p:spPr>
+                <a:xfrm>
+                  <a:off x="1318173" y="3106208"/>
+                  <a:ext cx="278218" cy="215444"/>
+                </a:xfrm>
+                <a:prstGeom prst="rect">
+                  <a:avLst/>
+                </a:prstGeom>
+                <a:blipFill rotWithShape="1">
+                  <a:blip r:embed="rId26"/>
+                  <a:stretch>
+                    <a:fillRect/>
+                  </a:stretch>
+                </a:blipFill>
+              </p:spPr>
+              <p:txBody>
+                <a:bodyPr/>
+                <a:lstStyle/>
+                <a:p>
+                  <a:r>
+                    <a:rPr lang="fr-FR">
+                      <a:noFill/>
+                    </a:rPr>
+                    <a:t> </a:t>
+                  </a:r>
+                </a:p>
+              </p:txBody>
+            </p:sp>
+          </mc:Fallback>
+        </mc:AlternateContent>
+      </p:grpSp>
+    </p:spTree>
+    <p:extLst>
+      <p:ext uri="{BB962C8B-B14F-4D97-AF65-F5344CB8AC3E}">
+        <p14:creationId xmlns:p14="http://schemas.microsoft.com/office/powerpoint/2010/main" val="2027097985"/>
       </p:ext>
     </p:extLst>
   </p:cSld>

</xml_diff>